<commit_message>
add dataset description in presentazione ptx
</commit_message>
<xml_diff>
--- a/Presentazione.pptx
+++ b/Presentazione.pptx
@@ -134,16 +134,32 @@
 </p:presentation>
 </file>
 
-<file path=ppt/revisionInfo.xml><?xml version="1.0" encoding="utf-8"?>
-<p1510:revInfo xmlns:a="http://schemas.openxmlformats.org/drawingml/2006/main" xmlns:r="http://schemas.openxmlformats.org/officeDocument/2006/relationships" xmlns:p1510="http://schemas.microsoft.com/office/powerpoint/2015/10/main">
-  <p1510:revLst>
-    <p1510:client id="{51DA83A5-9DAC-2E4E-98CB-0F60CD469263}" v="1" dt="2020-11-23T10:47:53.953"/>
-  </p1510:revLst>
-</p1510:revInfo>
-</file>
-
 <file path=ppt/changesInfos/changesInfo1.xml><?xml version="1.0" encoding="utf-8"?>
 <pc:chgInfo xmlns:a="http://schemas.openxmlformats.org/drawingml/2006/main" xmlns:r="http://schemas.openxmlformats.org/officeDocument/2006/relationships" xmlns:ac="http://schemas.microsoft.com/office/drawing/2013/main/command" xmlns:pc="http://schemas.microsoft.com/office/powerpoint/2013/main/command">
+  <pc:docChgLst>
+    <pc:chgData name="Giacomo Volpi" userId="23fb5a46-3f6f-48f0-a51b-4e2cf33c8ac9" providerId="ADAL" clId="{E7FBA280-7707-4ECE-86A3-05D9889BF128}"/>
+    <pc:docChg chg="undo redo custSel modSld">
+      <pc:chgData name="Giacomo Volpi" userId="23fb5a46-3f6f-48f0-a51b-4e2cf33c8ac9" providerId="ADAL" clId="{E7FBA280-7707-4ECE-86A3-05D9889BF128}" dt="2022-12-06T08:33:50.772" v="683" actId="20577"/>
+      <pc:docMkLst>
+        <pc:docMk/>
+      </pc:docMkLst>
+      <pc:sldChg chg="modSp mod">
+        <pc:chgData name="Giacomo Volpi" userId="23fb5a46-3f6f-48f0-a51b-4e2cf33c8ac9" providerId="ADAL" clId="{E7FBA280-7707-4ECE-86A3-05D9889BF128}" dt="2022-12-06T08:33:50.772" v="683" actId="20577"/>
+        <pc:sldMkLst>
+          <pc:docMk/>
+          <pc:sldMk cId="1056679543" sldId="258"/>
+        </pc:sldMkLst>
+        <pc:spChg chg="mod">
+          <ac:chgData name="Giacomo Volpi" userId="23fb5a46-3f6f-48f0-a51b-4e2cf33c8ac9" providerId="ADAL" clId="{E7FBA280-7707-4ECE-86A3-05D9889BF128}" dt="2022-12-06T08:33:50.772" v="683" actId="20577"/>
+          <ac:spMkLst>
+            <pc:docMk/>
+            <pc:sldMk cId="1056679543" sldId="258"/>
+            <ac:spMk id="3" creationId="{068E8217-0879-6045-A028-80534F620714}"/>
+          </ac:spMkLst>
+        </pc:spChg>
+      </pc:sldChg>
+    </pc:docChg>
+  </pc:docChgLst>
   <pc:docChgLst>
     <pc:chgData name="Pietro Ducange" userId="3881275a-5346-4624-88aa-cc4682e089e6" providerId="ADAL" clId="{51DA83A5-9DAC-2E4E-98CB-0F60CD469263}"/>
     <pc:docChg chg="modSld">
@@ -268,7 +284,7 @@
           <a:p>
             <a:fld id="{0EF95162-6873-F647-B392-BF6A1F606277}" type="datetimeFigureOut">
               <a:rPr lang="it-IT" smtClean="0"/>
-              <a:t>05/12/2022</a:t>
+              <a:t>06/12/2022</a:t>
             </a:fld>
             <a:endParaRPr lang="it-IT"/>
           </a:p>
@@ -426,7 +442,7 @@
           <a:p>
             <a:fld id="{60FDF8BA-B6A2-CC4D-B552-37BF044E1040}" type="slidenum">
               <a:rPr lang="it-IT" smtClean="0"/>
-              <a:t>‹#›</a:t>
+              <a:t>‹N›</a:t>
             </a:fld>
             <a:endParaRPr lang="it-IT"/>
           </a:p>
@@ -722,7 +738,7 @@
           <a:p>
             <a:fld id="{2FDCBEE4-315A-8E42-835E-29A1DAE07625}" type="datetimeFigureOut">
               <a:rPr lang="it-IT" smtClean="0"/>
-              <a:t>05/12/2022</a:t>
+              <a:t>06/12/2022</a:t>
             </a:fld>
             <a:endParaRPr lang="it-IT"/>
           </a:p>
@@ -780,7 +796,7 @@
           <a:p>
             <a:fld id="{F3EAF9BD-73C2-C944-967F-16A9AD6CE362}" type="slidenum">
               <a:rPr lang="it-IT" smtClean="0"/>
-              <a:t>‹#›</a:t>
+              <a:t>‹N›</a:t>
             </a:fld>
             <a:endParaRPr lang="it-IT"/>
           </a:p>
@@ -914,7 +930,7 @@
           <a:p>
             <a:fld id="{2FDCBEE4-315A-8E42-835E-29A1DAE07625}" type="datetimeFigureOut">
               <a:rPr lang="it-IT" smtClean="0"/>
-              <a:t>05/12/2022</a:t>
+              <a:t>06/12/2022</a:t>
             </a:fld>
             <a:endParaRPr lang="it-IT"/>
           </a:p>
@@ -972,7 +988,7 @@
           <a:p>
             <a:fld id="{F3EAF9BD-73C2-C944-967F-16A9AD6CE362}" type="slidenum">
               <a:rPr lang="it-IT" smtClean="0"/>
-              <a:t>‹#›</a:t>
+              <a:t>‹N›</a:t>
             </a:fld>
             <a:endParaRPr lang="it-IT"/>
           </a:p>
@@ -1116,7 +1132,7 @@
           <a:p>
             <a:fld id="{2FDCBEE4-315A-8E42-835E-29A1DAE07625}" type="datetimeFigureOut">
               <a:rPr lang="it-IT" smtClean="0"/>
-              <a:t>05/12/2022</a:t>
+              <a:t>06/12/2022</a:t>
             </a:fld>
             <a:endParaRPr lang="it-IT"/>
           </a:p>
@@ -1174,7 +1190,7 @@
           <a:p>
             <a:fld id="{F3EAF9BD-73C2-C944-967F-16A9AD6CE362}" type="slidenum">
               <a:rPr lang="it-IT" smtClean="0"/>
-              <a:t>‹#›</a:t>
+              <a:t>‹N›</a:t>
             </a:fld>
             <a:endParaRPr lang="it-IT"/>
           </a:p>
@@ -1308,7 +1324,7 @@
           <a:p>
             <a:fld id="{2FDCBEE4-315A-8E42-835E-29A1DAE07625}" type="datetimeFigureOut">
               <a:rPr lang="it-IT" smtClean="0"/>
-              <a:t>05/12/2022</a:t>
+              <a:t>06/12/2022</a:t>
             </a:fld>
             <a:endParaRPr lang="it-IT"/>
           </a:p>
@@ -1366,7 +1382,7 @@
           <a:p>
             <a:fld id="{F3EAF9BD-73C2-C944-967F-16A9AD6CE362}" type="slidenum">
               <a:rPr lang="it-IT" smtClean="0"/>
-              <a:t>‹#›</a:t>
+              <a:t>‹N›</a:t>
             </a:fld>
             <a:endParaRPr lang="it-IT"/>
           </a:p>
@@ -1577,7 +1593,7 @@
           <a:p>
             <a:fld id="{2FDCBEE4-315A-8E42-835E-29A1DAE07625}" type="datetimeFigureOut">
               <a:rPr lang="it-IT" smtClean="0"/>
-              <a:t>05/12/2022</a:t>
+              <a:t>06/12/2022</a:t>
             </a:fld>
             <a:endParaRPr lang="it-IT"/>
           </a:p>
@@ -1635,7 +1651,7 @@
           <a:p>
             <a:fld id="{F3EAF9BD-73C2-C944-967F-16A9AD6CE362}" type="slidenum">
               <a:rPr lang="it-IT" smtClean="0"/>
-              <a:t>‹#›</a:t>
+              <a:t>‹N›</a:t>
             </a:fld>
             <a:endParaRPr lang="it-IT"/>
           </a:p>
@@ -1886,7 +1902,7 @@
           <a:p>
             <a:fld id="{2FDCBEE4-315A-8E42-835E-29A1DAE07625}" type="datetimeFigureOut">
               <a:rPr lang="it-IT" smtClean="0"/>
-              <a:t>05/12/2022</a:t>
+              <a:t>06/12/2022</a:t>
             </a:fld>
             <a:endParaRPr lang="it-IT"/>
           </a:p>
@@ -1944,7 +1960,7 @@
           <a:p>
             <a:fld id="{F3EAF9BD-73C2-C944-967F-16A9AD6CE362}" type="slidenum">
               <a:rPr lang="it-IT" smtClean="0"/>
-              <a:t>‹#›</a:t>
+              <a:t>‹N›</a:t>
             </a:fld>
             <a:endParaRPr lang="it-IT"/>
           </a:p>
@@ -2329,7 +2345,7 @@
           <a:p>
             <a:fld id="{2FDCBEE4-315A-8E42-835E-29A1DAE07625}" type="datetimeFigureOut">
               <a:rPr lang="it-IT" smtClean="0"/>
-              <a:t>05/12/2022</a:t>
+              <a:t>06/12/2022</a:t>
             </a:fld>
             <a:endParaRPr lang="it-IT"/>
           </a:p>
@@ -2387,7 +2403,7 @@
           <a:p>
             <a:fld id="{F3EAF9BD-73C2-C944-967F-16A9AD6CE362}" type="slidenum">
               <a:rPr lang="it-IT" smtClean="0"/>
-              <a:t>‹#›</a:t>
+              <a:t>‹N›</a:t>
             </a:fld>
             <a:endParaRPr lang="it-IT"/>
           </a:p>
@@ -2470,7 +2486,7 @@
           <a:p>
             <a:fld id="{2FDCBEE4-315A-8E42-835E-29A1DAE07625}" type="datetimeFigureOut">
               <a:rPr lang="it-IT" smtClean="0"/>
-              <a:t>05/12/2022</a:t>
+              <a:t>06/12/2022</a:t>
             </a:fld>
             <a:endParaRPr lang="it-IT"/>
           </a:p>
@@ -2528,7 +2544,7 @@
           <a:p>
             <a:fld id="{F3EAF9BD-73C2-C944-967F-16A9AD6CE362}" type="slidenum">
               <a:rPr lang="it-IT" smtClean="0"/>
-              <a:t>‹#›</a:t>
+              <a:t>‹N›</a:t>
             </a:fld>
             <a:endParaRPr lang="it-IT"/>
           </a:p>
@@ -2589,7 +2605,7 @@
           <a:p>
             <a:fld id="{2FDCBEE4-315A-8E42-835E-29A1DAE07625}" type="datetimeFigureOut">
               <a:rPr lang="it-IT" smtClean="0"/>
-              <a:t>05/12/2022</a:t>
+              <a:t>06/12/2022</a:t>
             </a:fld>
             <a:endParaRPr lang="it-IT"/>
           </a:p>
@@ -2647,7 +2663,7 @@
           <a:p>
             <a:fld id="{F3EAF9BD-73C2-C944-967F-16A9AD6CE362}" type="slidenum">
               <a:rPr lang="it-IT" smtClean="0"/>
-              <a:t>‹#›</a:t>
+              <a:t>‹N›</a:t>
             </a:fld>
             <a:endParaRPr lang="it-IT"/>
           </a:p>
@@ -2888,7 +2904,7 @@
           <a:p>
             <a:fld id="{2FDCBEE4-315A-8E42-835E-29A1DAE07625}" type="datetimeFigureOut">
               <a:rPr lang="it-IT" smtClean="0"/>
-              <a:t>05/12/2022</a:t>
+              <a:t>06/12/2022</a:t>
             </a:fld>
             <a:endParaRPr lang="it-IT"/>
           </a:p>
@@ -2946,7 +2962,7 @@
           <a:p>
             <a:fld id="{F3EAF9BD-73C2-C944-967F-16A9AD6CE362}" type="slidenum">
               <a:rPr lang="it-IT" smtClean="0"/>
-              <a:t>‹#›</a:t>
+              <a:t>‹N›</a:t>
             </a:fld>
             <a:endParaRPr lang="it-IT"/>
           </a:p>
@@ -3164,7 +3180,7 @@
           <a:p>
             <a:fld id="{2FDCBEE4-315A-8E42-835E-29A1DAE07625}" type="datetimeFigureOut">
               <a:rPr lang="it-IT" smtClean="0"/>
-              <a:t>05/12/2022</a:t>
+              <a:t>06/12/2022</a:t>
             </a:fld>
             <a:endParaRPr lang="it-IT"/>
           </a:p>
@@ -3222,7 +3238,7 @@
           <a:p>
             <a:fld id="{F3EAF9BD-73C2-C944-967F-16A9AD6CE362}" type="slidenum">
               <a:rPr lang="it-IT" smtClean="0"/>
-              <a:t>‹#›</a:t>
+              <a:t>‹N›</a:t>
             </a:fld>
             <a:endParaRPr lang="it-IT"/>
           </a:p>
@@ -4295,7 +4311,7 @@
         <p:spPr>
           <a:xfrm>
             <a:off x="397485" y="1642016"/>
-            <a:ext cx="8349029" cy="3170099"/>
+            <a:ext cx="8349029" cy="3785652"/>
           </a:xfrm>
           <a:prstGeom prst="rect">
             <a:avLst/>
@@ -4308,11 +4324,21 @@
           </a:bodyPr>
           <a:lstStyle/>
           <a:p>
-            <a:pPr lvl="0"/>
             <a:r>
               <a:rPr lang="en-US" sz="2000" b="1" i="1" dirty="0"/>
-              <a:t>Source:</a:t>
-            </a:r>
+              <a:t>Source: </a:t>
+            </a:r>
+            <a:r>
+              <a:rPr lang="en-US" sz="2000" i="0" dirty="0">
+                <a:solidFill>
+                  <a:srgbClr val="202124"/>
+                </a:solidFill>
+                <a:effectLst/>
+                <a:latin typeface="zeitung"/>
+              </a:rPr>
+              <a:t>Rotten Tomatoes (Kaggle) and IMDB (IMDB)</a:t>
+            </a:r>
+            <a:endParaRPr lang="en-US" sz="2000" i="1" dirty="0"/>
           </a:p>
           <a:p>
             <a:pPr lvl="0"/>
@@ -4322,7 +4348,11 @@
             <a:pPr lvl="0"/>
             <a:r>
               <a:rPr lang="en-US" sz="2000" b="1" i="1" dirty="0"/>
-              <a:t>Description:</a:t>
+              <a:t>Description: </a:t>
+            </a:r>
+            <a:r>
+              <a:rPr lang="en-US" sz="2000" dirty="0"/>
+              <a:t>The dataset contains basic information about the movies like the title, the cast and crew with roles, the year of release, the runtime and the production houses. In addition, the dataset contains the reviews and scores for the movies divided between top critics and audience.  </a:t>
             </a:r>
           </a:p>
           <a:p>
@@ -4333,8 +4363,13 @@
             <a:pPr lvl="0"/>
             <a:r>
               <a:rPr lang="en-US" sz="2000" b="1" i="1" dirty="0"/>
-              <a:t>Volume:</a:t>
-            </a:r>
+              <a:t>Volume: </a:t>
+            </a:r>
+            <a:r>
+              <a:rPr lang="en-US" sz="2000"/>
+              <a:t>~174MB</a:t>
+            </a:r>
+            <a:endParaRPr lang="en-US" sz="2000" dirty="0"/>
           </a:p>
           <a:p>
             <a:pPr lvl="0"/>
@@ -4348,27 +4383,12 @@
             </a:r>
             <a:r>
               <a:rPr lang="en-US" sz="2000" dirty="0"/>
-              <a:t>: </a:t>
+              <a:t>: IMDB’s dataset used to retrieve information about the films and Rotten Tomatoes’ one used to obtain the reviews about the movies</a:t>
             </a:r>
           </a:p>
           <a:p>
             <a:pPr lvl="0"/>
             <a:endParaRPr lang="en-US" sz="2000" b="1" i="1" dirty="0"/>
-          </a:p>
-          <a:p>
-            <a:pPr lvl="0"/>
-            <a:r>
-              <a:rPr lang="en-US" sz="2000" b="1" i="1" dirty="0"/>
-              <a:t>Velocity/Variability</a:t>
-            </a:r>
-            <a:r>
-              <a:rPr lang="en-US" sz="2000" dirty="0"/>
-              <a:t>:</a:t>
-            </a:r>
-            <a:endParaRPr lang="it-IT" sz="2000" dirty="0"/>
-          </a:p>
-          <a:p>
-            <a:endParaRPr lang="en-US" sz="2000" dirty="0"/>
           </a:p>
         </p:txBody>
       </p:sp>

</xml_diff>

<commit_message>
inserted use case and class diagram in presentation, created file for template document json
</commit_message>
<xml_diff>
--- a/Presentazione.pptx
+++ b/Presentazione.pptx
@@ -5,7 +5,7 @@
     <p:sldMasterId id="2147483648" r:id="rId1"/>
   </p:sldMasterIdLst>
   <p:notesMasterIdLst>
-    <p:notesMasterId r:id="rId11"/>
+    <p:notesMasterId r:id="rId10"/>
   </p:notesMasterIdLst>
   <p:sldIdLst>
     <p:sldId id="256" r:id="rId2"/>
@@ -14,9 +14,8 @@
     <p:sldId id="258" r:id="rId5"/>
     <p:sldId id="259" r:id="rId6"/>
     <p:sldId id="260" r:id="rId7"/>
-    <p:sldId id="261" r:id="rId8"/>
-    <p:sldId id="262" r:id="rId9"/>
-    <p:sldId id="264" r:id="rId10"/>
+    <p:sldId id="262" r:id="rId8"/>
+    <p:sldId id="264" r:id="rId9"/>
   </p:sldIdLst>
   <p:sldSz cx="9144000" cy="6858000" type="screen4x3"/>
   <p:notesSz cx="6858000" cy="9144000"/>
@@ -442,7 +441,7 @@
           <a:p>
             <a:fld id="{60FDF8BA-B6A2-CC4D-B552-37BF044E1040}" type="slidenum">
               <a:rPr lang="it-IT" smtClean="0"/>
-              <a:t>‹N›</a:t>
+              <a:t>‹#›</a:t>
             </a:fld>
             <a:endParaRPr lang="it-IT"/>
           </a:p>
@@ -796,7 +795,7 @@
           <a:p>
             <a:fld id="{F3EAF9BD-73C2-C944-967F-16A9AD6CE362}" type="slidenum">
               <a:rPr lang="it-IT" smtClean="0"/>
-              <a:t>‹N›</a:t>
+              <a:t>‹#›</a:t>
             </a:fld>
             <a:endParaRPr lang="it-IT"/>
           </a:p>
@@ -988,7 +987,7 @@
           <a:p>
             <a:fld id="{F3EAF9BD-73C2-C944-967F-16A9AD6CE362}" type="slidenum">
               <a:rPr lang="it-IT" smtClean="0"/>
-              <a:t>‹N›</a:t>
+              <a:t>‹#›</a:t>
             </a:fld>
             <a:endParaRPr lang="it-IT"/>
           </a:p>
@@ -1190,7 +1189,7 @@
           <a:p>
             <a:fld id="{F3EAF9BD-73C2-C944-967F-16A9AD6CE362}" type="slidenum">
               <a:rPr lang="it-IT" smtClean="0"/>
-              <a:t>‹N›</a:t>
+              <a:t>‹#›</a:t>
             </a:fld>
             <a:endParaRPr lang="it-IT"/>
           </a:p>
@@ -1382,7 +1381,7 @@
           <a:p>
             <a:fld id="{F3EAF9BD-73C2-C944-967F-16A9AD6CE362}" type="slidenum">
               <a:rPr lang="it-IT" smtClean="0"/>
-              <a:t>‹N›</a:t>
+              <a:t>‹#›</a:t>
             </a:fld>
             <a:endParaRPr lang="it-IT"/>
           </a:p>
@@ -1651,7 +1650,7 @@
           <a:p>
             <a:fld id="{F3EAF9BD-73C2-C944-967F-16A9AD6CE362}" type="slidenum">
               <a:rPr lang="it-IT" smtClean="0"/>
-              <a:t>‹N›</a:t>
+              <a:t>‹#›</a:t>
             </a:fld>
             <a:endParaRPr lang="it-IT"/>
           </a:p>
@@ -1960,7 +1959,7 @@
           <a:p>
             <a:fld id="{F3EAF9BD-73C2-C944-967F-16A9AD6CE362}" type="slidenum">
               <a:rPr lang="it-IT" smtClean="0"/>
-              <a:t>‹N›</a:t>
+              <a:t>‹#›</a:t>
             </a:fld>
             <a:endParaRPr lang="it-IT"/>
           </a:p>
@@ -2403,7 +2402,7 @@
           <a:p>
             <a:fld id="{F3EAF9BD-73C2-C944-967F-16A9AD6CE362}" type="slidenum">
               <a:rPr lang="it-IT" smtClean="0"/>
-              <a:t>‹N›</a:t>
+              <a:t>‹#›</a:t>
             </a:fld>
             <a:endParaRPr lang="it-IT"/>
           </a:p>
@@ -2544,7 +2543,7 @@
           <a:p>
             <a:fld id="{F3EAF9BD-73C2-C944-967F-16A9AD6CE362}" type="slidenum">
               <a:rPr lang="it-IT" smtClean="0"/>
-              <a:t>‹N›</a:t>
+              <a:t>‹#›</a:t>
             </a:fld>
             <a:endParaRPr lang="it-IT"/>
           </a:p>
@@ -2663,7 +2662,7 @@
           <a:p>
             <a:fld id="{F3EAF9BD-73C2-C944-967F-16A9AD6CE362}" type="slidenum">
               <a:rPr lang="it-IT" smtClean="0"/>
-              <a:t>‹N›</a:t>
+              <a:t>‹#›</a:t>
             </a:fld>
             <a:endParaRPr lang="it-IT"/>
           </a:p>
@@ -2962,7 +2961,7 @@
           <a:p>
             <a:fld id="{F3EAF9BD-73C2-C944-967F-16A9AD6CE362}" type="slidenum">
               <a:rPr lang="it-IT" smtClean="0"/>
-              <a:t>‹N›</a:t>
+              <a:t>‹#›</a:t>
             </a:fld>
             <a:endParaRPr lang="it-IT"/>
           </a:p>
@@ -3238,7 +3237,7 @@
           <a:p>
             <a:fld id="{F3EAF9BD-73C2-C944-967F-16A9AD6CE362}" type="slidenum">
               <a:rPr lang="it-IT" smtClean="0"/>
-              <a:t>‹N›</a:t>
+              <a:t>‹#›</a:t>
             </a:fld>
             <a:endParaRPr lang="it-IT"/>
           </a:p>
@@ -4184,60 +4183,55 @@
             <p:ph type="title"/>
           </p:nvPr>
         </p:nvSpPr>
-        <p:spPr/>
+        <p:spPr>
+          <a:xfrm>
+            <a:off x="182741" y="-126403"/>
+            <a:ext cx="8761797" cy="738582"/>
+          </a:xfrm>
+        </p:spPr>
         <p:txBody>
           <a:bodyPr>
-            <a:normAutofit fontScale="90000"/>
+            <a:noAutofit/>
           </a:bodyPr>
           <a:lstStyle/>
           <a:p>
             <a:r>
-              <a:rPr lang="en-US" dirty="0"/>
+              <a:rPr lang="en-US" sz="2800" dirty="0"/>
               <a:t>Actors and main supported functionalities</a:t>
             </a:r>
           </a:p>
         </p:txBody>
       </p:sp>
-      <p:sp>
-        <p:nvSpPr>
-          <p:cNvPr id="3" name="CasellaDiTesto 2">
+      <p:pic>
+        <p:nvPicPr>
+          <p:cNvPr id="9" name="Picture 8" descr="Diagram&#10;&#10;Description automatically generated">
             <a:extLst>
               <a:ext uri="{FF2B5EF4-FFF2-40B4-BE49-F238E27FC236}">
-                <a16:creationId xmlns:a16="http://schemas.microsoft.com/office/drawing/2014/main" id="{391F4034-971B-8A4B-888B-5902E8333D6B}"/>
+                <a16:creationId xmlns:a16="http://schemas.microsoft.com/office/drawing/2014/main" id="{5A6604FC-927D-74D2-D212-FD3614CC19CB}"/>
               </a:ext>
             </a:extLst>
           </p:cNvPr>
-          <p:cNvSpPr txBox="1"/>
+          <p:cNvPicPr>
+            <a:picLocks noChangeAspect="1"/>
+          </p:cNvPicPr>
           <p:nvPr/>
-        </p:nvSpPr>
-        <p:spPr>
-          <a:xfrm>
-            <a:off x="457200" y="1812471"/>
-            <a:ext cx="8213271" cy="369332"/>
+        </p:nvPicPr>
+        <p:blipFill>
+          <a:blip r:embed="rId2"/>
+          <a:stretch>
+            <a:fillRect/>
+          </a:stretch>
+        </p:blipFill>
+        <p:spPr>
+          <a:xfrm>
+            <a:off x="1250209" y="423256"/>
+            <a:ext cx="6750791" cy="6378886"/>
           </a:xfrm>
           <a:prstGeom prst="rect">
             <a:avLst/>
           </a:prstGeom>
-          <a:noFill/>
-        </p:spPr>
-        <p:txBody>
-          <a:bodyPr wrap="square" rtlCol="0">
-            <a:spAutoFit/>
-          </a:bodyPr>
-          <a:lstStyle/>
-          <a:p>
-            <a:r>
-              <a:rPr lang="en-US" dirty="0"/>
-              <a:t>A simplified use case diagram </a:t>
-            </a:r>
-            <a:r>
-              <a:rPr lang="en-US"/>
-              <a:t>can be used.</a:t>
-            </a:r>
-            <a:endParaRPr lang="en-US" dirty="0"/>
-          </a:p>
-        </p:txBody>
-      </p:sp>
+        </p:spPr>
+      </p:pic>
     </p:spTree>
     <p:extLst>
       <p:ext uri="{BB962C8B-B14F-4D97-AF65-F5344CB8AC3E}">
@@ -4450,6 +4444,36 @@
           </a:p>
         </p:txBody>
       </p:sp>
+      <p:pic>
+        <p:nvPicPr>
+          <p:cNvPr id="4" name="Picture 3" descr="Diagram&#10;&#10;Description automatically generated">
+            <a:extLst>
+              <a:ext uri="{FF2B5EF4-FFF2-40B4-BE49-F238E27FC236}">
+                <a16:creationId xmlns:a16="http://schemas.microsoft.com/office/drawing/2014/main" id="{90B9F380-CA51-F804-AA36-84AE14CE117C}"/>
+              </a:ext>
+            </a:extLst>
+          </p:cNvPr>
+          <p:cNvPicPr>
+            <a:picLocks noChangeAspect="1"/>
+          </p:cNvPicPr>
+          <p:nvPr/>
+        </p:nvPicPr>
+        <p:blipFill>
+          <a:blip r:embed="rId2"/>
+          <a:stretch>
+            <a:fillRect/>
+          </a:stretch>
+        </p:blipFill>
+        <p:spPr>
+          <a:xfrm>
+            <a:off x="182740" y="1227548"/>
+            <a:ext cx="8761798" cy="4394518"/>
+          </a:xfrm>
+          <a:prstGeom prst="rect">
+            <a:avLst/>
+          </a:prstGeom>
+        </p:spPr>
+      </p:pic>
     </p:spTree>
     <p:extLst>
       <p:ext uri="{BB962C8B-B14F-4D97-AF65-F5344CB8AC3E}">
@@ -4579,73 +4603,6 @@
             </a:br>
             <a:r>
               <a:rPr lang="en-US" dirty="0"/>
-              <a:t>handled by Key-Value DB</a:t>
-            </a:r>
-          </a:p>
-        </p:txBody>
-      </p:sp>
-    </p:spTree>
-    <p:extLst>
-      <p:ext uri="{BB962C8B-B14F-4D97-AF65-F5344CB8AC3E}">
-        <p14:creationId xmlns:p14="http://schemas.microsoft.com/office/powerpoint/2010/main" val="4165861081"/>
-      </p:ext>
-    </p:extLst>
-  </p:cSld>
-  <p:clrMapOvr>
-    <a:masterClrMapping/>
-  </p:clrMapOvr>
-</p:sld>
-</file>
-
-<file path=ppt/slides/slide8.xml><?xml version="1.0" encoding="utf-8"?>
-<p:sld xmlns:a="http://schemas.openxmlformats.org/drawingml/2006/main" xmlns:r="http://schemas.openxmlformats.org/officeDocument/2006/relationships" xmlns:p="http://schemas.openxmlformats.org/presentationml/2006/main">
-  <p:cSld>
-    <p:spTree>
-      <p:nvGrpSpPr>
-        <p:cNvPr id="1" name=""/>
-        <p:cNvGrpSpPr/>
-        <p:nvPr/>
-      </p:nvGrpSpPr>
-      <p:grpSpPr>
-        <a:xfrm>
-          <a:off x="0" y="0"/>
-          <a:ext cx="0" cy="0"/>
-          <a:chOff x="0" y="0"/>
-          <a:chExt cx="0" cy="0"/>
-        </a:xfrm>
-      </p:grpSpPr>
-      <p:sp>
-        <p:nvSpPr>
-          <p:cNvPr id="2" name="Titolo 1">
-            <a:extLst>
-              <a:ext uri="{FF2B5EF4-FFF2-40B4-BE49-F238E27FC236}">
-                <a16:creationId xmlns:a16="http://schemas.microsoft.com/office/drawing/2014/main" id="{B8C7EEC7-48BB-B542-9A2A-E3C09D99B916}"/>
-              </a:ext>
-            </a:extLst>
-          </p:cNvPr>
-          <p:cNvSpPr>
-            <a:spLocks noGrp="1"/>
-          </p:cNvSpPr>
-          <p:nvPr>
-            <p:ph type="title"/>
-          </p:nvPr>
-        </p:nvSpPr>
-        <p:spPr/>
-        <p:txBody>
-          <a:bodyPr>
-            <a:normAutofit fontScale="90000"/>
-          </a:bodyPr>
-          <a:lstStyle/>
-          <a:p>
-            <a:r>
-              <a:rPr lang="en-US" dirty="0"/>
-              <a:t>Requirements and Entities </a:t>
-            </a:r>
-            <a:br>
-              <a:rPr lang="en-US" dirty="0"/>
-            </a:br>
-            <a:r>
-              <a:rPr lang="en-US" dirty="0"/>
               <a:t>handled by Graph DB</a:t>
             </a:r>
           </a:p>
@@ -4664,7 +4621,7 @@
 </p:sld>
 </file>
 
-<file path=ppt/slides/slide9.xml><?xml version="1.0" encoding="utf-8"?>
+<file path=ppt/slides/slide8.xml><?xml version="1.0" encoding="utf-8"?>
 <p:sld xmlns:a="http://schemas.openxmlformats.org/drawingml/2006/main" xmlns:r="http://schemas.openxmlformats.org/officeDocument/2006/relationships" xmlns:p="http://schemas.openxmlformats.org/presentationml/2006/main">
   <p:cSld>
     <p:spTree>

</xml_diff>

<commit_message>
Modified the class diagram and changed the presentation
</commit_message>
<xml_diff>
--- a/Presentazione.pptx
+++ b/Presentazione.pptx
@@ -133,6 +133,14 @@
 </p:presentation>
 </file>
 
+<file path=ppt/revisionInfo.xml><?xml version="1.0" encoding="utf-8"?>
+<p1510:revInfo xmlns:a="http://schemas.openxmlformats.org/drawingml/2006/main" xmlns:r="http://schemas.openxmlformats.org/officeDocument/2006/relationships" xmlns:p1510="http://schemas.microsoft.com/office/powerpoint/2015/10/main">
+  <p1510:revLst>
+    <p1510:client id="{9A323347-3376-446A-9D0B-571111A78440}" v="7" dt="2022-12-07T13:55:32.775"/>
+  </p1510:revLst>
+</p1510:revInfo>
+</file>
+
 <file path=ppt/changesInfos/changesInfo1.xml><?xml version="1.0" encoding="utf-8"?>
 <pc:chgInfo xmlns:a="http://schemas.openxmlformats.org/drawingml/2006/main" xmlns:r="http://schemas.openxmlformats.org/officeDocument/2006/relationships" xmlns:ac="http://schemas.microsoft.com/office/drawing/2013/main/command" xmlns:pc="http://schemas.microsoft.com/office/powerpoint/2013/main/command">
   <pc:docChgLst>
@@ -156,6 +164,114 @@
             <ac:spMk id="3" creationId="{068E8217-0879-6045-A028-80534F620714}"/>
           </ac:spMkLst>
         </pc:spChg>
+      </pc:sldChg>
+    </pc:docChg>
+  </pc:docChgLst>
+  <pc:docChgLst>
+    <pc:chgData name="Giacomo Volpi" userId="23fb5a46-3f6f-48f0-a51b-4e2cf33c8ac9" providerId="ADAL" clId="{9A323347-3376-446A-9D0B-571111A78440}"/>
+    <pc:docChg chg="undo custSel modSld">
+      <pc:chgData name="Giacomo Volpi" userId="23fb5a46-3f6f-48f0-a51b-4e2cf33c8ac9" providerId="ADAL" clId="{9A323347-3376-446A-9D0B-571111A78440}" dt="2022-12-07T13:59:39.335" v="250" actId="20577"/>
+      <pc:docMkLst>
+        <pc:docMk/>
+      </pc:docMkLst>
+      <pc:sldChg chg="modSp mod">
+        <pc:chgData name="Giacomo Volpi" userId="23fb5a46-3f6f-48f0-a51b-4e2cf33c8ac9" providerId="ADAL" clId="{9A323347-3376-446A-9D0B-571111A78440}" dt="2022-12-07T13:59:39.335" v="250" actId="20577"/>
+        <pc:sldMkLst>
+          <pc:docMk/>
+          <pc:sldMk cId="1056679543" sldId="258"/>
+        </pc:sldMkLst>
+        <pc:spChg chg="mod">
+          <ac:chgData name="Giacomo Volpi" userId="23fb5a46-3f6f-48f0-a51b-4e2cf33c8ac9" providerId="ADAL" clId="{9A323347-3376-446A-9D0B-571111A78440}" dt="2022-12-07T13:59:39.335" v="250" actId="20577"/>
+          <ac:spMkLst>
+            <pc:docMk/>
+            <pc:sldMk cId="1056679543" sldId="258"/>
+            <ac:spMk id="3" creationId="{068E8217-0879-6045-A028-80534F620714}"/>
+          </ac:spMkLst>
+        </pc:spChg>
+      </pc:sldChg>
+      <pc:sldChg chg="addSp delSp modSp mod modClrScheme chgLayout">
+        <pc:chgData name="Giacomo Volpi" userId="23fb5a46-3f6f-48f0-a51b-4e2cf33c8ac9" providerId="ADAL" clId="{9A323347-3376-446A-9D0B-571111A78440}" dt="2022-12-07T13:50:25.739" v="6" actId="14100"/>
+        <pc:sldMkLst>
+          <pc:docMk/>
+          <pc:sldMk cId="773792551" sldId="259"/>
+        </pc:sldMkLst>
+        <pc:spChg chg="mod">
+          <ac:chgData name="Giacomo Volpi" userId="23fb5a46-3f6f-48f0-a51b-4e2cf33c8ac9" providerId="ADAL" clId="{9A323347-3376-446A-9D0B-571111A78440}" dt="2022-12-07T13:50:11.935" v="3" actId="26606"/>
+          <ac:spMkLst>
+            <pc:docMk/>
+            <pc:sldMk cId="773792551" sldId="259"/>
+            <ac:spMk id="2" creationId="{831A7364-9B4E-DC49-AA70-BE5A302DEAAF}"/>
+          </ac:spMkLst>
+        </pc:spChg>
+        <pc:picChg chg="del">
+          <ac:chgData name="Giacomo Volpi" userId="23fb5a46-3f6f-48f0-a51b-4e2cf33c8ac9" providerId="ADAL" clId="{9A323347-3376-446A-9D0B-571111A78440}" dt="2022-12-07T13:48:50.227" v="0" actId="478"/>
+          <ac:picMkLst>
+            <pc:docMk/>
+            <pc:sldMk cId="773792551" sldId="259"/>
+            <ac:picMk id="4" creationId="{90B9F380-CA51-F804-AA36-84AE14CE117C}"/>
+          </ac:picMkLst>
+        </pc:picChg>
+        <pc:picChg chg="add mod">
+          <ac:chgData name="Giacomo Volpi" userId="23fb5a46-3f6f-48f0-a51b-4e2cf33c8ac9" providerId="ADAL" clId="{9A323347-3376-446A-9D0B-571111A78440}" dt="2022-12-07T13:50:25.739" v="6" actId="14100"/>
+          <ac:picMkLst>
+            <pc:docMk/>
+            <pc:sldMk cId="773792551" sldId="259"/>
+            <ac:picMk id="5" creationId="{D67212DD-1168-C6F8-3B2D-C10917E98340}"/>
+          </ac:picMkLst>
+        </pc:picChg>
+      </pc:sldChg>
+      <pc:sldChg chg="addSp modSp mod">
+        <pc:chgData name="Giacomo Volpi" userId="23fb5a46-3f6f-48f0-a51b-4e2cf33c8ac9" providerId="ADAL" clId="{9A323347-3376-446A-9D0B-571111A78440}" dt="2022-12-07T13:58:10.762" v="191" actId="20577"/>
+        <pc:sldMkLst>
+          <pc:docMk/>
+          <pc:sldMk cId="877565826" sldId="260"/>
+        </pc:sldMkLst>
+        <pc:spChg chg="add mod">
+          <ac:chgData name="Giacomo Volpi" userId="23fb5a46-3f6f-48f0-a51b-4e2cf33c8ac9" providerId="ADAL" clId="{9A323347-3376-446A-9D0B-571111A78440}" dt="2022-12-07T13:58:10.762" v="191" actId="20577"/>
+          <ac:spMkLst>
+            <pc:docMk/>
+            <pc:sldMk cId="877565826" sldId="260"/>
+            <ac:spMk id="3" creationId="{E91BD0A9-1547-B4E9-98FA-911D1FFE7F2E}"/>
+          </ac:spMkLst>
+        </pc:spChg>
+      </pc:sldChg>
+      <pc:sldChg chg="addSp modSp mod">
+        <pc:chgData name="Giacomo Volpi" userId="23fb5a46-3f6f-48f0-a51b-4e2cf33c8ac9" providerId="ADAL" clId="{9A323347-3376-446A-9D0B-571111A78440}" dt="2022-12-07T13:58:01.801" v="190" actId="20577"/>
+        <pc:sldMkLst>
+          <pc:docMk/>
+          <pc:sldMk cId="1127430590" sldId="262"/>
+        </pc:sldMkLst>
+        <pc:spChg chg="add mod">
+          <ac:chgData name="Giacomo Volpi" userId="23fb5a46-3f6f-48f0-a51b-4e2cf33c8ac9" providerId="ADAL" clId="{9A323347-3376-446A-9D0B-571111A78440}" dt="2022-12-07T13:58:01.801" v="190" actId="20577"/>
+          <ac:spMkLst>
+            <pc:docMk/>
+            <pc:sldMk cId="1127430590" sldId="262"/>
+            <ac:spMk id="3" creationId="{7DC5F64D-6F30-5671-1FEF-FD4D616265D2}"/>
+          </ac:spMkLst>
+        </pc:spChg>
+      </pc:sldChg>
+      <pc:sldChg chg="addSp delSp modSp mod">
+        <pc:chgData name="Giacomo Volpi" userId="23fb5a46-3f6f-48f0-a51b-4e2cf33c8ac9" providerId="ADAL" clId="{9A323347-3376-446A-9D0B-571111A78440}" dt="2022-12-07T13:54:00.867" v="20" actId="767"/>
+        <pc:sldMkLst>
+          <pc:docMk/>
+          <pc:sldMk cId="710998634" sldId="263"/>
+        </pc:sldMkLst>
+        <pc:spChg chg="add del mod">
+          <ac:chgData name="Giacomo Volpi" userId="23fb5a46-3f6f-48f0-a51b-4e2cf33c8ac9" providerId="ADAL" clId="{9A323347-3376-446A-9D0B-571111A78440}" dt="2022-12-07T13:54:00.867" v="20" actId="767"/>
+          <ac:spMkLst>
+            <pc:docMk/>
+            <pc:sldMk cId="710998634" sldId="263"/>
+            <ac:spMk id="3" creationId="{39D90630-3668-4154-4B3C-99554B951C68}"/>
+          </ac:spMkLst>
+        </pc:spChg>
+        <pc:picChg chg="mod">
+          <ac:chgData name="Giacomo Volpi" userId="23fb5a46-3f6f-48f0-a51b-4e2cf33c8ac9" providerId="ADAL" clId="{9A323347-3376-446A-9D0B-571111A78440}" dt="2022-12-07T13:54:00.442" v="19" actId="1076"/>
+          <ac:picMkLst>
+            <pc:docMk/>
+            <pc:sldMk cId="710998634" sldId="263"/>
+            <ac:picMk id="9" creationId="{5A6604FC-927D-74D2-D212-FD3614CC19CB}"/>
+          </ac:picMkLst>
+        </pc:picChg>
       </pc:sldChg>
     </pc:docChg>
   </pc:docChgLst>
@@ -283,7 +399,7 @@
           <a:p>
             <a:fld id="{0EF95162-6873-F647-B392-BF6A1F606277}" type="datetimeFigureOut">
               <a:rPr lang="it-IT" smtClean="0"/>
-              <a:t>06/12/2022</a:t>
+              <a:t>07/12/2022</a:t>
             </a:fld>
             <a:endParaRPr lang="it-IT"/>
           </a:p>
@@ -441,7 +557,7 @@
           <a:p>
             <a:fld id="{60FDF8BA-B6A2-CC4D-B552-37BF044E1040}" type="slidenum">
               <a:rPr lang="it-IT" smtClean="0"/>
-              <a:t>‹#›</a:t>
+              <a:t>‹N›</a:t>
             </a:fld>
             <a:endParaRPr lang="it-IT"/>
           </a:p>
@@ -737,7 +853,7 @@
           <a:p>
             <a:fld id="{2FDCBEE4-315A-8E42-835E-29A1DAE07625}" type="datetimeFigureOut">
               <a:rPr lang="it-IT" smtClean="0"/>
-              <a:t>06/12/2022</a:t>
+              <a:t>07/12/2022</a:t>
             </a:fld>
             <a:endParaRPr lang="it-IT"/>
           </a:p>
@@ -795,7 +911,7 @@
           <a:p>
             <a:fld id="{F3EAF9BD-73C2-C944-967F-16A9AD6CE362}" type="slidenum">
               <a:rPr lang="it-IT" smtClean="0"/>
-              <a:t>‹#›</a:t>
+              <a:t>‹N›</a:t>
             </a:fld>
             <a:endParaRPr lang="it-IT"/>
           </a:p>
@@ -929,7 +1045,7 @@
           <a:p>
             <a:fld id="{2FDCBEE4-315A-8E42-835E-29A1DAE07625}" type="datetimeFigureOut">
               <a:rPr lang="it-IT" smtClean="0"/>
-              <a:t>06/12/2022</a:t>
+              <a:t>07/12/2022</a:t>
             </a:fld>
             <a:endParaRPr lang="it-IT"/>
           </a:p>
@@ -987,7 +1103,7 @@
           <a:p>
             <a:fld id="{F3EAF9BD-73C2-C944-967F-16A9AD6CE362}" type="slidenum">
               <a:rPr lang="it-IT" smtClean="0"/>
-              <a:t>‹#›</a:t>
+              <a:t>‹N›</a:t>
             </a:fld>
             <a:endParaRPr lang="it-IT"/>
           </a:p>
@@ -1131,7 +1247,7 @@
           <a:p>
             <a:fld id="{2FDCBEE4-315A-8E42-835E-29A1DAE07625}" type="datetimeFigureOut">
               <a:rPr lang="it-IT" smtClean="0"/>
-              <a:t>06/12/2022</a:t>
+              <a:t>07/12/2022</a:t>
             </a:fld>
             <a:endParaRPr lang="it-IT"/>
           </a:p>
@@ -1189,7 +1305,7 @@
           <a:p>
             <a:fld id="{F3EAF9BD-73C2-C944-967F-16A9AD6CE362}" type="slidenum">
               <a:rPr lang="it-IT" smtClean="0"/>
-              <a:t>‹#›</a:t>
+              <a:t>‹N›</a:t>
             </a:fld>
             <a:endParaRPr lang="it-IT"/>
           </a:p>
@@ -1323,7 +1439,7 @@
           <a:p>
             <a:fld id="{2FDCBEE4-315A-8E42-835E-29A1DAE07625}" type="datetimeFigureOut">
               <a:rPr lang="it-IT" smtClean="0"/>
-              <a:t>06/12/2022</a:t>
+              <a:t>07/12/2022</a:t>
             </a:fld>
             <a:endParaRPr lang="it-IT"/>
           </a:p>
@@ -1381,7 +1497,7 @@
           <a:p>
             <a:fld id="{F3EAF9BD-73C2-C944-967F-16A9AD6CE362}" type="slidenum">
               <a:rPr lang="it-IT" smtClean="0"/>
-              <a:t>‹#›</a:t>
+              <a:t>‹N›</a:t>
             </a:fld>
             <a:endParaRPr lang="it-IT"/>
           </a:p>
@@ -1592,7 +1708,7 @@
           <a:p>
             <a:fld id="{2FDCBEE4-315A-8E42-835E-29A1DAE07625}" type="datetimeFigureOut">
               <a:rPr lang="it-IT" smtClean="0"/>
-              <a:t>06/12/2022</a:t>
+              <a:t>07/12/2022</a:t>
             </a:fld>
             <a:endParaRPr lang="it-IT"/>
           </a:p>
@@ -1650,7 +1766,7 @@
           <a:p>
             <a:fld id="{F3EAF9BD-73C2-C944-967F-16A9AD6CE362}" type="slidenum">
               <a:rPr lang="it-IT" smtClean="0"/>
-              <a:t>‹#›</a:t>
+              <a:t>‹N›</a:t>
             </a:fld>
             <a:endParaRPr lang="it-IT"/>
           </a:p>
@@ -1901,7 +2017,7 @@
           <a:p>
             <a:fld id="{2FDCBEE4-315A-8E42-835E-29A1DAE07625}" type="datetimeFigureOut">
               <a:rPr lang="it-IT" smtClean="0"/>
-              <a:t>06/12/2022</a:t>
+              <a:t>07/12/2022</a:t>
             </a:fld>
             <a:endParaRPr lang="it-IT"/>
           </a:p>
@@ -1959,7 +2075,7 @@
           <a:p>
             <a:fld id="{F3EAF9BD-73C2-C944-967F-16A9AD6CE362}" type="slidenum">
               <a:rPr lang="it-IT" smtClean="0"/>
-              <a:t>‹#›</a:t>
+              <a:t>‹N›</a:t>
             </a:fld>
             <a:endParaRPr lang="it-IT"/>
           </a:p>
@@ -2344,7 +2460,7 @@
           <a:p>
             <a:fld id="{2FDCBEE4-315A-8E42-835E-29A1DAE07625}" type="datetimeFigureOut">
               <a:rPr lang="it-IT" smtClean="0"/>
-              <a:t>06/12/2022</a:t>
+              <a:t>07/12/2022</a:t>
             </a:fld>
             <a:endParaRPr lang="it-IT"/>
           </a:p>
@@ -2402,7 +2518,7 @@
           <a:p>
             <a:fld id="{F3EAF9BD-73C2-C944-967F-16A9AD6CE362}" type="slidenum">
               <a:rPr lang="it-IT" smtClean="0"/>
-              <a:t>‹#›</a:t>
+              <a:t>‹N›</a:t>
             </a:fld>
             <a:endParaRPr lang="it-IT"/>
           </a:p>
@@ -2485,7 +2601,7 @@
           <a:p>
             <a:fld id="{2FDCBEE4-315A-8E42-835E-29A1DAE07625}" type="datetimeFigureOut">
               <a:rPr lang="it-IT" smtClean="0"/>
-              <a:t>06/12/2022</a:t>
+              <a:t>07/12/2022</a:t>
             </a:fld>
             <a:endParaRPr lang="it-IT"/>
           </a:p>
@@ -2543,7 +2659,7 @@
           <a:p>
             <a:fld id="{F3EAF9BD-73C2-C944-967F-16A9AD6CE362}" type="slidenum">
               <a:rPr lang="it-IT" smtClean="0"/>
-              <a:t>‹#›</a:t>
+              <a:t>‹N›</a:t>
             </a:fld>
             <a:endParaRPr lang="it-IT"/>
           </a:p>
@@ -2604,7 +2720,7 @@
           <a:p>
             <a:fld id="{2FDCBEE4-315A-8E42-835E-29A1DAE07625}" type="datetimeFigureOut">
               <a:rPr lang="it-IT" smtClean="0"/>
-              <a:t>06/12/2022</a:t>
+              <a:t>07/12/2022</a:t>
             </a:fld>
             <a:endParaRPr lang="it-IT"/>
           </a:p>
@@ -2662,7 +2778,7 @@
           <a:p>
             <a:fld id="{F3EAF9BD-73C2-C944-967F-16A9AD6CE362}" type="slidenum">
               <a:rPr lang="it-IT" smtClean="0"/>
-              <a:t>‹#›</a:t>
+              <a:t>‹N›</a:t>
             </a:fld>
             <a:endParaRPr lang="it-IT"/>
           </a:p>
@@ -2903,7 +3019,7 @@
           <a:p>
             <a:fld id="{2FDCBEE4-315A-8E42-835E-29A1DAE07625}" type="datetimeFigureOut">
               <a:rPr lang="it-IT" smtClean="0"/>
-              <a:t>06/12/2022</a:t>
+              <a:t>07/12/2022</a:t>
             </a:fld>
             <a:endParaRPr lang="it-IT"/>
           </a:p>
@@ -2961,7 +3077,7 @@
           <a:p>
             <a:fld id="{F3EAF9BD-73C2-C944-967F-16A9AD6CE362}" type="slidenum">
               <a:rPr lang="it-IT" smtClean="0"/>
-              <a:t>‹#›</a:t>
+              <a:t>‹N›</a:t>
             </a:fld>
             <a:endParaRPr lang="it-IT"/>
           </a:p>
@@ -3179,7 +3295,7 @@
           <a:p>
             <a:fld id="{2FDCBEE4-315A-8E42-835E-29A1DAE07625}" type="datetimeFigureOut">
               <a:rPr lang="it-IT" smtClean="0"/>
-              <a:t>06/12/2022</a:t>
+              <a:t>07/12/2022</a:t>
             </a:fld>
             <a:endParaRPr lang="it-IT"/>
           </a:p>
@@ -3237,7 +3353,7 @@
           <a:p>
             <a:fld id="{F3EAF9BD-73C2-C944-967F-16A9AD6CE362}" type="slidenum">
               <a:rPr lang="it-IT" smtClean="0"/>
-              <a:t>‹#›</a:t>
+              <a:t>‹N›</a:t>
             </a:fld>
             <a:endParaRPr lang="it-IT"/>
           </a:p>
@@ -4224,7 +4340,7 @@
         </p:blipFill>
         <p:spPr>
           <a:xfrm>
-            <a:off x="1250209" y="423256"/>
+            <a:off x="1250209" y="362296"/>
             <a:ext cx="6750791" cy="6378886"/>
           </a:xfrm>
           <a:prstGeom prst="rect">
@@ -4346,7 +4462,15 @@
             </a:r>
             <a:r>
               <a:rPr lang="en-US" sz="2000" dirty="0"/>
-              <a:t>The dataset contains basic information about the movies like the title, the cast and crew with roles, the year of release, the runtime and the production houses. In addition, the dataset contains the reviews and scores for the movies divided between top critics and audience.  </a:t>
+              <a:t>From IMDB dataset -&gt; basic information about the movies like the title, the cast and crew with roles, the year of release, the runtime and the production houses. From Rotten Tomatoes </a:t>
+            </a:r>
+            <a:r>
+              <a:rPr lang="en-US" sz="2000"/>
+              <a:t>-&gt; reviews </a:t>
+            </a:r>
+            <a:r>
+              <a:rPr lang="en-US" sz="2000" dirty="0"/>
+              <a:t>and scores for the movies divided between top critics and audience.  </a:t>
             </a:r>
           </a:p>
           <a:p>
@@ -4360,10 +4484,9 @@
               <a:t>Volume: </a:t>
             </a:r>
             <a:r>
-              <a:rPr lang="en-US" sz="2000"/>
+              <a:rPr lang="en-US" sz="2000" dirty="0"/>
               <a:t>~174MB</a:t>
             </a:r>
-            <a:endParaRPr lang="en-US" sz="2000" dirty="0"/>
           </a:p>
           <a:p>
             <a:pPr lvl="0"/>
@@ -4446,10 +4569,10 @@
       </p:sp>
       <p:pic>
         <p:nvPicPr>
-          <p:cNvPr id="4" name="Picture 3" descr="Diagram&#10;&#10;Description automatically generated">
+          <p:cNvPr id="5" name="Immagine 4">
             <a:extLst>
               <a:ext uri="{FF2B5EF4-FFF2-40B4-BE49-F238E27FC236}">
-                <a16:creationId xmlns:a16="http://schemas.microsoft.com/office/drawing/2014/main" id="{90B9F380-CA51-F804-AA36-84AE14CE117C}"/>
+                <a16:creationId xmlns:a16="http://schemas.microsoft.com/office/drawing/2014/main" id="{D67212DD-1168-C6F8-3B2D-C10917E98340}"/>
               </a:ext>
             </a:extLst>
           </p:cNvPr>
@@ -4466,8 +4589,8 @@
         </p:blipFill>
         <p:spPr>
           <a:xfrm>
-            <a:off x="182740" y="1227548"/>
-            <a:ext cx="8761798" cy="4394518"/>
+            <a:off x="38971" y="1323277"/>
+            <a:ext cx="9066058" cy="4396804"/>
           </a:xfrm>
           <a:prstGeom prst="rect">
             <a:avLst/>
@@ -4541,6 +4664,55 @@
           </a:p>
         </p:txBody>
       </p:sp>
+      <p:sp>
+        <p:nvSpPr>
+          <p:cNvPr id="3" name="CasellaDiTesto 2">
+            <a:extLst>
+              <a:ext uri="{FF2B5EF4-FFF2-40B4-BE49-F238E27FC236}">
+                <a16:creationId xmlns:a16="http://schemas.microsoft.com/office/drawing/2014/main" id="{E91BD0A9-1547-B4E9-98FA-911D1FFE7F2E}"/>
+              </a:ext>
+            </a:extLst>
+          </p:cNvPr>
+          <p:cNvSpPr txBox="1"/>
+          <p:nvPr/>
+        </p:nvSpPr>
+        <p:spPr>
+          <a:xfrm>
+            <a:off x="397485" y="1642016"/>
+            <a:ext cx="8349029" cy="1015663"/>
+          </a:xfrm>
+          <a:prstGeom prst="rect">
+            <a:avLst/>
+          </a:prstGeom>
+          <a:noFill/>
+        </p:spPr>
+        <p:txBody>
+          <a:bodyPr wrap="square" rtlCol="0">
+            <a:spAutoFit/>
+          </a:bodyPr>
+          <a:lstStyle/>
+          <a:p>
+            <a:r>
+              <a:rPr lang="en-US" sz="2000" b="1" i="1" dirty="0"/>
+              <a:t>Entities: </a:t>
+            </a:r>
+            <a:r>
+              <a:rPr lang="en-US" sz="2000" dirty="0"/>
+              <a:t>Movie, Review</a:t>
+            </a:r>
+          </a:p>
+          <a:p>
+            <a:endParaRPr lang="en-US" sz="2000" b="1" i="1" dirty="0"/>
+          </a:p>
+          <a:p>
+            <a:pPr lvl="0"/>
+            <a:r>
+              <a:rPr lang="en-US" sz="2000" b="1" i="1" dirty="0"/>
+              <a:t>Queries: </a:t>
+            </a:r>
+          </a:p>
+        </p:txBody>
+      </p:sp>
     </p:spTree>
     <p:extLst>
       <p:ext uri="{BB962C8B-B14F-4D97-AF65-F5344CB8AC3E}">
@@ -4604,6 +4776,80 @@
             <a:r>
               <a:rPr lang="en-US" dirty="0"/>
               <a:t>handled by Graph DB</a:t>
+            </a:r>
+          </a:p>
+        </p:txBody>
+      </p:sp>
+      <p:sp>
+        <p:nvSpPr>
+          <p:cNvPr id="3" name="CasellaDiTesto 2">
+            <a:extLst>
+              <a:ext uri="{FF2B5EF4-FFF2-40B4-BE49-F238E27FC236}">
+                <a16:creationId xmlns:a16="http://schemas.microsoft.com/office/drawing/2014/main" id="{7DC5F64D-6F30-5671-1FEF-FD4D616265D2}"/>
+              </a:ext>
+            </a:extLst>
+          </p:cNvPr>
+          <p:cNvSpPr txBox="1"/>
+          <p:nvPr/>
+        </p:nvSpPr>
+        <p:spPr>
+          <a:xfrm>
+            <a:off x="397485" y="1642016"/>
+            <a:ext cx="8349029" cy="1015663"/>
+          </a:xfrm>
+          <a:prstGeom prst="rect">
+            <a:avLst/>
+          </a:prstGeom>
+          <a:noFill/>
+        </p:spPr>
+        <p:txBody>
+          <a:bodyPr wrap="square" rtlCol="0">
+            <a:spAutoFit/>
+          </a:bodyPr>
+          <a:lstStyle/>
+          <a:p>
+            <a:r>
+              <a:rPr lang="en-US" sz="2000" b="1" i="1" dirty="0"/>
+              <a:t>Entities:</a:t>
+            </a:r>
+            <a:r>
+              <a:rPr lang="en-US" sz="2000" b="1" dirty="0">
+                <a:solidFill>
+                  <a:srgbClr val="202124"/>
+                </a:solidFill>
+                <a:latin typeface="zeitung"/>
+              </a:rPr>
+              <a:t> </a:t>
+            </a:r>
+            <a:r>
+              <a:rPr lang="en-US" sz="2000" dirty="0">
+                <a:solidFill>
+                  <a:srgbClr val="202124"/>
+                </a:solidFill>
+                <a:latin typeface="zeitung"/>
+              </a:rPr>
+              <a:t>User, Movie, </a:t>
+            </a:r>
+            <a:r>
+              <a:rPr lang="en-US" sz="2000" dirty="0" err="1">
+                <a:solidFill>
+                  <a:srgbClr val="202124"/>
+                </a:solidFill>
+                <a:latin typeface="zeitung"/>
+              </a:rPr>
+              <a:t>TopCritic</a:t>
+            </a:r>
+            <a:endParaRPr lang="en-US" sz="2000" i="1" dirty="0"/>
+          </a:p>
+          <a:p>
+            <a:pPr lvl="0"/>
+            <a:endParaRPr lang="en-US" sz="2000" b="1" i="1" dirty="0"/>
+          </a:p>
+          <a:p>
+            <a:pPr lvl="0"/>
+            <a:r>
+              <a:rPr lang="en-US" sz="2000" b="1" i="1" dirty="0"/>
+              <a:t>Queries: </a:t>
             </a:r>
           </a:p>
         </p:txBody>

</xml_diff>

<commit_message>
added diagrams for the document & graph db. Added the queries to the presentation
</commit_message>
<xml_diff>
--- a/Presentazione.pptx
+++ b/Presentazione.pptx
@@ -168,6 +168,45 @@
     </pc:docChg>
   </pc:docChgLst>
   <pc:docChgLst>
+    <pc:chgData name="Pietro Ducange" userId="3881275a-5346-4624-88aa-cc4682e089e6" providerId="ADAL" clId="{51DA83A5-9DAC-2E4E-98CB-0F60CD469263}"/>
+    <pc:docChg chg="modSld">
+      <pc:chgData name="Pietro Ducange" userId="3881275a-5346-4624-88aa-cc4682e089e6" providerId="ADAL" clId="{51DA83A5-9DAC-2E4E-98CB-0F60CD469263}" dt="2020-11-23T15:19:35.337" v="73" actId="14100"/>
+      <pc:docMkLst>
+        <pc:docMk/>
+      </pc:docMkLst>
+      <pc:sldChg chg="modSp mod">
+        <pc:chgData name="Pietro Ducange" userId="3881275a-5346-4624-88aa-cc4682e089e6" providerId="ADAL" clId="{51DA83A5-9DAC-2E4E-98CB-0F60CD469263}" dt="2020-11-23T15:19:35.337" v="73" actId="14100"/>
+        <pc:sldMkLst>
+          <pc:docMk/>
+          <pc:sldMk cId="1621469791" sldId="256"/>
+        </pc:sldMkLst>
+        <pc:spChg chg="mod">
+          <ac:chgData name="Pietro Ducange" userId="3881275a-5346-4624-88aa-cc4682e089e6" providerId="ADAL" clId="{51DA83A5-9DAC-2E4E-98CB-0F60CD469263}" dt="2020-11-23T15:19:35.337" v="73" actId="14100"/>
+          <ac:spMkLst>
+            <pc:docMk/>
+            <pc:sldMk cId="1621469791" sldId="256"/>
+            <ac:spMk id="2" creationId="{00000000-0000-0000-0000-000000000000}"/>
+          </ac:spMkLst>
+        </pc:spChg>
+      </pc:sldChg>
+      <pc:sldChg chg="addSp modSp mod">
+        <pc:chgData name="Pietro Ducange" userId="3881275a-5346-4624-88aa-cc4682e089e6" providerId="ADAL" clId="{51DA83A5-9DAC-2E4E-98CB-0F60CD469263}" dt="2020-11-23T10:48:14.343" v="71" actId="20577"/>
+        <pc:sldMkLst>
+          <pc:docMk/>
+          <pc:sldMk cId="710998634" sldId="263"/>
+        </pc:sldMkLst>
+        <pc:spChg chg="add mod">
+          <ac:chgData name="Pietro Ducange" userId="3881275a-5346-4624-88aa-cc4682e089e6" providerId="ADAL" clId="{51DA83A5-9DAC-2E4E-98CB-0F60CD469263}" dt="2020-11-23T10:48:14.343" v="71" actId="20577"/>
+          <ac:spMkLst>
+            <pc:docMk/>
+            <pc:sldMk cId="710998634" sldId="263"/>
+            <ac:spMk id="3" creationId="{391F4034-971B-8A4B-888B-5902E8333D6B}"/>
+          </ac:spMkLst>
+        </pc:spChg>
+      </pc:sldChg>
+    </pc:docChg>
+  </pc:docChgLst>
+  <pc:docChgLst>
     <pc:chgData name="Giacomo Volpi" userId="23fb5a46-3f6f-48f0-a51b-4e2cf33c8ac9" providerId="ADAL" clId="{9A323347-3376-446A-9D0B-571111A78440}"/>
     <pc:docChg chg="undo custSel modSld">
       <pc:chgData name="Giacomo Volpi" userId="23fb5a46-3f6f-48f0-a51b-4e2cf33c8ac9" providerId="ADAL" clId="{9A323347-3376-446A-9D0B-571111A78440}" dt="2022-12-07T13:59:39.335" v="250" actId="20577"/>
@@ -275,45 +314,6 @@
       </pc:sldChg>
     </pc:docChg>
   </pc:docChgLst>
-  <pc:docChgLst>
-    <pc:chgData name="Pietro Ducange" userId="3881275a-5346-4624-88aa-cc4682e089e6" providerId="ADAL" clId="{51DA83A5-9DAC-2E4E-98CB-0F60CD469263}"/>
-    <pc:docChg chg="modSld">
-      <pc:chgData name="Pietro Ducange" userId="3881275a-5346-4624-88aa-cc4682e089e6" providerId="ADAL" clId="{51DA83A5-9DAC-2E4E-98CB-0F60CD469263}" dt="2020-11-23T15:19:35.337" v="73" actId="14100"/>
-      <pc:docMkLst>
-        <pc:docMk/>
-      </pc:docMkLst>
-      <pc:sldChg chg="modSp mod">
-        <pc:chgData name="Pietro Ducange" userId="3881275a-5346-4624-88aa-cc4682e089e6" providerId="ADAL" clId="{51DA83A5-9DAC-2E4E-98CB-0F60CD469263}" dt="2020-11-23T15:19:35.337" v="73" actId="14100"/>
-        <pc:sldMkLst>
-          <pc:docMk/>
-          <pc:sldMk cId="1621469791" sldId="256"/>
-        </pc:sldMkLst>
-        <pc:spChg chg="mod">
-          <ac:chgData name="Pietro Ducange" userId="3881275a-5346-4624-88aa-cc4682e089e6" providerId="ADAL" clId="{51DA83A5-9DAC-2E4E-98CB-0F60CD469263}" dt="2020-11-23T15:19:35.337" v="73" actId="14100"/>
-          <ac:spMkLst>
-            <pc:docMk/>
-            <pc:sldMk cId="1621469791" sldId="256"/>
-            <ac:spMk id="2" creationId="{00000000-0000-0000-0000-000000000000}"/>
-          </ac:spMkLst>
-        </pc:spChg>
-      </pc:sldChg>
-      <pc:sldChg chg="addSp modSp mod">
-        <pc:chgData name="Pietro Ducange" userId="3881275a-5346-4624-88aa-cc4682e089e6" providerId="ADAL" clId="{51DA83A5-9DAC-2E4E-98CB-0F60CD469263}" dt="2020-11-23T10:48:14.343" v="71" actId="20577"/>
-        <pc:sldMkLst>
-          <pc:docMk/>
-          <pc:sldMk cId="710998634" sldId="263"/>
-        </pc:sldMkLst>
-        <pc:spChg chg="add mod">
-          <ac:chgData name="Pietro Ducange" userId="3881275a-5346-4624-88aa-cc4682e089e6" providerId="ADAL" clId="{51DA83A5-9DAC-2E4E-98CB-0F60CD469263}" dt="2020-11-23T10:48:14.343" v="71" actId="20577"/>
-          <ac:spMkLst>
-            <pc:docMk/>
-            <pc:sldMk cId="710998634" sldId="263"/>
-            <ac:spMk id="3" creationId="{391F4034-971B-8A4B-888B-5902E8333D6B}"/>
-          </ac:spMkLst>
-        </pc:spChg>
-      </pc:sldChg>
-    </pc:docChg>
-  </pc:docChgLst>
 </pc:chgInfo>
 </file>
 
@@ -399,7 +399,7 @@
           <a:p>
             <a:fld id="{0EF95162-6873-F647-B392-BF6A1F606277}" type="datetimeFigureOut">
               <a:rPr lang="it-IT" smtClean="0"/>
-              <a:t>07/12/2022</a:t>
+              <a:t>08/12/2022</a:t>
             </a:fld>
             <a:endParaRPr lang="it-IT"/>
           </a:p>
@@ -557,7 +557,7 @@
           <a:p>
             <a:fld id="{60FDF8BA-B6A2-CC4D-B552-37BF044E1040}" type="slidenum">
               <a:rPr lang="it-IT" smtClean="0"/>
-              <a:t>‹N›</a:t>
+              <a:t>‹#›</a:t>
             </a:fld>
             <a:endParaRPr lang="it-IT"/>
           </a:p>
@@ -853,7 +853,7 @@
           <a:p>
             <a:fld id="{2FDCBEE4-315A-8E42-835E-29A1DAE07625}" type="datetimeFigureOut">
               <a:rPr lang="it-IT" smtClean="0"/>
-              <a:t>07/12/2022</a:t>
+              <a:t>08/12/2022</a:t>
             </a:fld>
             <a:endParaRPr lang="it-IT"/>
           </a:p>
@@ -911,7 +911,7 @@
           <a:p>
             <a:fld id="{F3EAF9BD-73C2-C944-967F-16A9AD6CE362}" type="slidenum">
               <a:rPr lang="it-IT" smtClean="0"/>
-              <a:t>‹N›</a:t>
+              <a:t>‹#›</a:t>
             </a:fld>
             <a:endParaRPr lang="it-IT"/>
           </a:p>
@@ -1045,7 +1045,7 @@
           <a:p>
             <a:fld id="{2FDCBEE4-315A-8E42-835E-29A1DAE07625}" type="datetimeFigureOut">
               <a:rPr lang="it-IT" smtClean="0"/>
-              <a:t>07/12/2022</a:t>
+              <a:t>08/12/2022</a:t>
             </a:fld>
             <a:endParaRPr lang="it-IT"/>
           </a:p>
@@ -1103,7 +1103,7 @@
           <a:p>
             <a:fld id="{F3EAF9BD-73C2-C944-967F-16A9AD6CE362}" type="slidenum">
               <a:rPr lang="it-IT" smtClean="0"/>
-              <a:t>‹N›</a:t>
+              <a:t>‹#›</a:t>
             </a:fld>
             <a:endParaRPr lang="it-IT"/>
           </a:p>
@@ -1247,7 +1247,7 @@
           <a:p>
             <a:fld id="{2FDCBEE4-315A-8E42-835E-29A1DAE07625}" type="datetimeFigureOut">
               <a:rPr lang="it-IT" smtClean="0"/>
-              <a:t>07/12/2022</a:t>
+              <a:t>08/12/2022</a:t>
             </a:fld>
             <a:endParaRPr lang="it-IT"/>
           </a:p>
@@ -1305,7 +1305,7 @@
           <a:p>
             <a:fld id="{F3EAF9BD-73C2-C944-967F-16A9AD6CE362}" type="slidenum">
               <a:rPr lang="it-IT" smtClean="0"/>
-              <a:t>‹N›</a:t>
+              <a:t>‹#›</a:t>
             </a:fld>
             <a:endParaRPr lang="it-IT"/>
           </a:p>
@@ -1439,7 +1439,7 @@
           <a:p>
             <a:fld id="{2FDCBEE4-315A-8E42-835E-29A1DAE07625}" type="datetimeFigureOut">
               <a:rPr lang="it-IT" smtClean="0"/>
-              <a:t>07/12/2022</a:t>
+              <a:t>08/12/2022</a:t>
             </a:fld>
             <a:endParaRPr lang="it-IT"/>
           </a:p>
@@ -1497,7 +1497,7 @@
           <a:p>
             <a:fld id="{F3EAF9BD-73C2-C944-967F-16A9AD6CE362}" type="slidenum">
               <a:rPr lang="it-IT" smtClean="0"/>
-              <a:t>‹N›</a:t>
+              <a:t>‹#›</a:t>
             </a:fld>
             <a:endParaRPr lang="it-IT"/>
           </a:p>
@@ -1708,7 +1708,7 @@
           <a:p>
             <a:fld id="{2FDCBEE4-315A-8E42-835E-29A1DAE07625}" type="datetimeFigureOut">
               <a:rPr lang="it-IT" smtClean="0"/>
-              <a:t>07/12/2022</a:t>
+              <a:t>08/12/2022</a:t>
             </a:fld>
             <a:endParaRPr lang="it-IT"/>
           </a:p>
@@ -1766,7 +1766,7 @@
           <a:p>
             <a:fld id="{F3EAF9BD-73C2-C944-967F-16A9AD6CE362}" type="slidenum">
               <a:rPr lang="it-IT" smtClean="0"/>
-              <a:t>‹N›</a:t>
+              <a:t>‹#›</a:t>
             </a:fld>
             <a:endParaRPr lang="it-IT"/>
           </a:p>
@@ -2017,7 +2017,7 @@
           <a:p>
             <a:fld id="{2FDCBEE4-315A-8E42-835E-29A1DAE07625}" type="datetimeFigureOut">
               <a:rPr lang="it-IT" smtClean="0"/>
-              <a:t>07/12/2022</a:t>
+              <a:t>08/12/2022</a:t>
             </a:fld>
             <a:endParaRPr lang="it-IT"/>
           </a:p>
@@ -2075,7 +2075,7 @@
           <a:p>
             <a:fld id="{F3EAF9BD-73C2-C944-967F-16A9AD6CE362}" type="slidenum">
               <a:rPr lang="it-IT" smtClean="0"/>
-              <a:t>‹N›</a:t>
+              <a:t>‹#›</a:t>
             </a:fld>
             <a:endParaRPr lang="it-IT"/>
           </a:p>
@@ -2460,7 +2460,7 @@
           <a:p>
             <a:fld id="{2FDCBEE4-315A-8E42-835E-29A1DAE07625}" type="datetimeFigureOut">
               <a:rPr lang="it-IT" smtClean="0"/>
-              <a:t>07/12/2022</a:t>
+              <a:t>08/12/2022</a:t>
             </a:fld>
             <a:endParaRPr lang="it-IT"/>
           </a:p>
@@ -2518,7 +2518,7 @@
           <a:p>
             <a:fld id="{F3EAF9BD-73C2-C944-967F-16A9AD6CE362}" type="slidenum">
               <a:rPr lang="it-IT" smtClean="0"/>
-              <a:t>‹N›</a:t>
+              <a:t>‹#›</a:t>
             </a:fld>
             <a:endParaRPr lang="it-IT"/>
           </a:p>
@@ -2601,7 +2601,7 @@
           <a:p>
             <a:fld id="{2FDCBEE4-315A-8E42-835E-29A1DAE07625}" type="datetimeFigureOut">
               <a:rPr lang="it-IT" smtClean="0"/>
-              <a:t>07/12/2022</a:t>
+              <a:t>08/12/2022</a:t>
             </a:fld>
             <a:endParaRPr lang="it-IT"/>
           </a:p>
@@ -2659,7 +2659,7 @@
           <a:p>
             <a:fld id="{F3EAF9BD-73C2-C944-967F-16A9AD6CE362}" type="slidenum">
               <a:rPr lang="it-IT" smtClean="0"/>
-              <a:t>‹N›</a:t>
+              <a:t>‹#›</a:t>
             </a:fld>
             <a:endParaRPr lang="it-IT"/>
           </a:p>
@@ -2720,7 +2720,7 @@
           <a:p>
             <a:fld id="{2FDCBEE4-315A-8E42-835E-29A1DAE07625}" type="datetimeFigureOut">
               <a:rPr lang="it-IT" smtClean="0"/>
-              <a:t>07/12/2022</a:t>
+              <a:t>08/12/2022</a:t>
             </a:fld>
             <a:endParaRPr lang="it-IT"/>
           </a:p>
@@ -2778,7 +2778,7 @@
           <a:p>
             <a:fld id="{F3EAF9BD-73C2-C944-967F-16A9AD6CE362}" type="slidenum">
               <a:rPr lang="it-IT" smtClean="0"/>
-              <a:t>‹N›</a:t>
+              <a:t>‹#›</a:t>
             </a:fld>
             <a:endParaRPr lang="it-IT"/>
           </a:p>
@@ -3019,7 +3019,7 @@
           <a:p>
             <a:fld id="{2FDCBEE4-315A-8E42-835E-29A1DAE07625}" type="datetimeFigureOut">
               <a:rPr lang="it-IT" smtClean="0"/>
-              <a:t>07/12/2022</a:t>
+              <a:t>08/12/2022</a:t>
             </a:fld>
             <a:endParaRPr lang="it-IT"/>
           </a:p>
@@ -3077,7 +3077,7 @@
           <a:p>
             <a:fld id="{F3EAF9BD-73C2-C944-967F-16A9AD6CE362}" type="slidenum">
               <a:rPr lang="it-IT" smtClean="0"/>
-              <a:t>‹N›</a:t>
+              <a:t>‹#›</a:t>
             </a:fld>
             <a:endParaRPr lang="it-IT"/>
           </a:p>
@@ -3295,7 +3295,7 @@
           <a:p>
             <a:fld id="{2FDCBEE4-315A-8E42-835E-29A1DAE07625}" type="datetimeFigureOut">
               <a:rPr lang="it-IT" smtClean="0"/>
-              <a:t>07/12/2022</a:t>
+              <a:t>08/12/2022</a:t>
             </a:fld>
             <a:endParaRPr lang="it-IT"/>
           </a:p>
@@ -3353,7 +3353,7 @@
           <a:p>
             <a:fld id="{F3EAF9BD-73C2-C944-967F-16A9AD6CE362}" type="slidenum">
               <a:rPr lang="it-IT" smtClean="0"/>
-              <a:t>‹N›</a:t>
+              <a:t>‹#›</a:t>
             </a:fld>
             <a:endParaRPr lang="it-IT"/>
           </a:p>
@@ -4678,8 +4678,8 @@
         </p:nvSpPr>
         <p:spPr>
           <a:xfrm>
-            <a:off x="397485" y="1642016"/>
-            <a:ext cx="8349029" cy="1015663"/>
+            <a:off x="397485" y="1347904"/>
+            <a:ext cx="7974990" cy="5016758"/>
           </a:xfrm>
           <a:prstGeom prst="rect">
             <a:avLst/>
@@ -4698,8 +4698,29 @@
             </a:r>
             <a:r>
               <a:rPr lang="en-US" sz="2000" dirty="0"/>
-              <a:t>Movie, Review</a:t>
-            </a:r>
+              <a:t>Movie, User</a:t>
+            </a:r>
+          </a:p>
+          <a:p>
+            <a:endParaRPr lang="en-US" sz="2000" b="1" i="1" dirty="0"/>
+          </a:p>
+          <a:p>
+            <a:endParaRPr lang="en-US" sz="2000" b="1" i="1" dirty="0"/>
+          </a:p>
+          <a:p>
+            <a:endParaRPr lang="en-US" sz="2000" b="1" i="1" dirty="0"/>
+          </a:p>
+          <a:p>
+            <a:endParaRPr lang="en-US" sz="2000" b="1" i="1" dirty="0"/>
+          </a:p>
+          <a:p>
+            <a:endParaRPr lang="en-US" sz="2000" b="1" i="1" dirty="0"/>
+          </a:p>
+          <a:p>
+            <a:endParaRPr lang="en-US" sz="2000" b="1" i="1" dirty="0"/>
+          </a:p>
+          <a:p>
+            <a:endParaRPr lang="en-US" sz="2000" b="1" i="1" dirty="0"/>
           </a:p>
           <a:p>
             <a:endParaRPr lang="en-US" sz="2000" b="1" i="1" dirty="0"/>
@@ -4711,8 +4732,125 @@
               <a:t>Queries: </a:t>
             </a:r>
           </a:p>
-        </p:txBody>
-      </p:sp>
+          <a:p>
+            <a:pPr marL="342900" lvl="0" indent="-342900">
+              <a:buFont typeface="Arial" panose="020B0604020202020204" pitchFamily="34" charset="0"/>
+              <a:buChar char="•"/>
+            </a:pPr>
+            <a:r>
+              <a:rPr lang="en-US" sz="2000" dirty="0"/>
+              <a:t>Most positive reviewed movies for each genres</a:t>
+            </a:r>
+          </a:p>
+          <a:p>
+            <a:pPr marL="342900" lvl="0" indent="-342900">
+              <a:buFont typeface="Arial" panose="020B0604020202020204" pitchFamily="34" charset="0"/>
+              <a:buChar char="•"/>
+            </a:pPr>
+            <a:r>
+              <a:rPr lang="en-US" sz="2000" dirty="0"/>
+              <a:t>Most positive reviewed movies for each year</a:t>
+            </a:r>
+          </a:p>
+          <a:p>
+            <a:pPr marL="342900" lvl="0" indent="-342900">
+              <a:buFont typeface="Arial" panose="020B0604020202020204" pitchFamily="34" charset="0"/>
+              <a:buChar char="•"/>
+            </a:pPr>
+            <a:r>
+              <a:rPr lang="en-US" sz="2000" dirty="0"/>
+              <a:t>Most divisive movies</a:t>
+            </a:r>
+          </a:p>
+          <a:p>
+            <a:pPr marL="342900" lvl="0" indent="-342900">
+              <a:buFont typeface="Arial" panose="020B0604020202020204" pitchFamily="34" charset="0"/>
+              <a:buChar char="•"/>
+            </a:pPr>
+            <a:r>
+              <a:rPr lang="en-US" sz="2000" dirty="0"/>
+              <a:t>Most positive reviewed movies  in a timeframe</a:t>
+            </a:r>
+          </a:p>
+          <a:p>
+            <a:pPr marL="342900" lvl="0" indent="-342900">
+              <a:buFont typeface="Arial" panose="020B0604020202020204" pitchFamily="34" charset="0"/>
+              <a:buChar char="•"/>
+            </a:pPr>
+            <a:r>
+              <a:rPr lang="en-US" sz="2000" dirty="0"/>
+              <a:t>Most active users in terms of review</a:t>
+            </a:r>
+          </a:p>
+          <a:p>
+            <a:pPr marL="342900" lvl="0" indent="-342900">
+              <a:buFont typeface="Arial" panose="020B0604020202020204" pitchFamily="34" charset="0"/>
+              <a:buChar char="•"/>
+            </a:pPr>
+            <a:endParaRPr lang="en-US" sz="2000" b="1" i="1" dirty="0"/>
+          </a:p>
+        </p:txBody>
+      </p:sp>
+      <p:pic>
+        <p:nvPicPr>
+          <p:cNvPr id="9" name="Picture 8">
+            <a:extLst>
+              <a:ext uri="{FF2B5EF4-FFF2-40B4-BE49-F238E27FC236}">
+                <a16:creationId xmlns:a16="http://schemas.microsoft.com/office/drawing/2014/main" id="{72355D75-BB7B-30D1-1EA4-7C3BB692E05A}"/>
+              </a:ext>
+            </a:extLst>
+          </p:cNvPr>
+          <p:cNvPicPr>
+            <a:picLocks noChangeAspect="1"/>
+          </p:cNvPicPr>
+          <p:nvPr/>
+        </p:nvPicPr>
+        <p:blipFill>
+          <a:blip r:embed="rId2"/>
+          <a:stretch>
+            <a:fillRect/>
+          </a:stretch>
+        </p:blipFill>
+        <p:spPr>
+          <a:xfrm>
+            <a:off x="771525" y="1870916"/>
+            <a:ext cx="1922646" cy="2113954"/>
+          </a:xfrm>
+          <a:prstGeom prst="rect">
+            <a:avLst/>
+          </a:prstGeom>
+        </p:spPr>
+      </p:pic>
+      <p:pic>
+        <p:nvPicPr>
+          <p:cNvPr id="11" name="Picture 10">
+            <a:extLst>
+              <a:ext uri="{FF2B5EF4-FFF2-40B4-BE49-F238E27FC236}">
+                <a16:creationId xmlns:a16="http://schemas.microsoft.com/office/drawing/2014/main" id="{D8C2CDE3-9193-C986-DD7B-7BC2D664F990}"/>
+              </a:ext>
+            </a:extLst>
+          </p:cNvPr>
+          <p:cNvPicPr>
+            <a:picLocks noChangeAspect="1"/>
+          </p:cNvPicPr>
+          <p:nvPr/>
+        </p:nvPicPr>
+        <p:blipFill>
+          <a:blip r:embed="rId3"/>
+          <a:stretch>
+            <a:fillRect/>
+          </a:stretch>
+        </p:blipFill>
+        <p:spPr>
+          <a:xfrm>
+            <a:off x="4202907" y="1594393"/>
+            <a:ext cx="2660832" cy="2667000"/>
+          </a:xfrm>
+          <a:prstGeom prst="rect">
+            <a:avLst/>
+          </a:prstGeom>
+        </p:spPr>
+      </p:pic>
     </p:spTree>
     <p:extLst>
       <p:ext uri="{BB962C8B-B14F-4D97-AF65-F5344CB8AC3E}">
@@ -4794,8 +4932,8 @@
         </p:nvSpPr>
         <p:spPr>
           <a:xfrm>
-            <a:off x="397485" y="1642016"/>
-            <a:ext cx="8349029" cy="1015663"/>
+            <a:off x="397486" y="1642016"/>
+            <a:ext cx="3031514" cy="3170099"/>
           </a:xfrm>
           <a:prstGeom prst="rect">
             <a:avLst/>
@@ -4821,6 +4959,12 @@
               </a:rPr>
               <a:t> </a:t>
             </a:r>
+          </a:p>
+          <a:p>
+            <a:pPr marL="342900" indent="-342900">
+              <a:buFont typeface="Arial" panose="020B0604020202020204" pitchFamily="34" charset="0"/>
+              <a:buChar char="•"/>
+            </a:pPr>
             <a:r>
               <a:rPr lang="en-US" sz="2000" dirty="0">
                 <a:solidFill>
@@ -4828,8 +4972,29 @@
                 </a:solidFill>
                 <a:latin typeface="zeitung"/>
               </a:rPr>
-              <a:t>User, Movie, </a:t>
-            </a:r>
+              <a:t>User</a:t>
+            </a:r>
+          </a:p>
+          <a:p>
+            <a:pPr marL="342900" indent="-342900">
+              <a:buFont typeface="Arial" panose="020B0604020202020204" pitchFamily="34" charset="0"/>
+              <a:buChar char="•"/>
+            </a:pPr>
+            <a:r>
+              <a:rPr lang="en-US" sz="2000" dirty="0">
+                <a:solidFill>
+                  <a:srgbClr val="202124"/>
+                </a:solidFill>
+                <a:latin typeface="zeitung"/>
+              </a:rPr>
+              <a:t>Movie</a:t>
+            </a:r>
+          </a:p>
+          <a:p>
+            <a:pPr marL="342900" indent="-342900">
+              <a:buFont typeface="Arial" panose="020B0604020202020204" pitchFamily="34" charset="0"/>
+              <a:buChar char="•"/>
+            </a:pPr>
             <a:r>
               <a:rPr lang="en-US" sz="2000" dirty="0" err="1">
                 <a:solidFill>
@@ -4847,13 +5012,67 @@
           </a:p>
           <a:p>
             <a:pPr lvl="0"/>
+            <a:endParaRPr lang="en-US" sz="2000" b="1" i="1" dirty="0"/>
+          </a:p>
+          <a:p>
+            <a:pPr lvl="0"/>
             <a:r>
               <a:rPr lang="en-US" sz="2000" b="1" i="1" dirty="0"/>
               <a:t>Queries: </a:t>
             </a:r>
           </a:p>
-        </p:txBody>
-      </p:sp>
+          <a:p>
+            <a:pPr marL="342900" lvl="0" indent="-342900">
+              <a:buFont typeface="Arial" panose="020B0604020202020204" pitchFamily="34" charset="0"/>
+              <a:buChar char="•"/>
+            </a:pPr>
+            <a:r>
+              <a:rPr lang="en-US" sz="2000" dirty="0"/>
+              <a:t>Most followed top critic</a:t>
+            </a:r>
+          </a:p>
+          <a:p>
+            <a:pPr marL="342900" lvl="0" indent="-342900">
+              <a:buFont typeface="Arial" panose="020B0604020202020204" pitchFamily="34" charset="0"/>
+              <a:buChar char="•"/>
+            </a:pPr>
+            <a:r>
+              <a:rPr lang="en-US" sz="2000" dirty="0"/>
+              <a:t>Affinity with followed top critic</a:t>
+            </a:r>
+          </a:p>
+        </p:txBody>
+      </p:sp>
+      <p:pic>
+        <p:nvPicPr>
+          <p:cNvPr id="5" name="Picture 4">
+            <a:extLst>
+              <a:ext uri="{FF2B5EF4-FFF2-40B4-BE49-F238E27FC236}">
+                <a16:creationId xmlns:a16="http://schemas.microsoft.com/office/drawing/2014/main" id="{AAE2FF15-82B6-3090-8B13-971F43B9B304}"/>
+              </a:ext>
+            </a:extLst>
+          </p:cNvPr>
+          <p:cNvPicPr>
+            <a:picLocks noChangeAspect="1"/>
+          </p:cNvPicPr>
+          <p:nvPr/>
+        </p:nvPicPr>
+        <p:blipFill>
+          <a:blip r:embed="rId2"/>
+          <a:stretch>
+            <a:fillRect/>
+          </a:stretch>
+        </p:blipFill>
+        <p:spPr>
+          <a:xfrm>
+            <a:off x="3145813" y="1718871"/>
+            <a:ext cx="5600701" cy="3659125"/>
+          </a:xfrm>
+          <a:prstGeom prst="rect">
+            <a:avLst/>
+          </a:prstGeom>
+        </p:spPr>
+      </p:pic>
     </p:spTree>
     <p:extLst>
       <p:ext uri="{BB962C8B-B14F-4D97-AF65-F5344CB8AC3E}">
@@ -4911,6 +5130,13 @@
               <a:rPr lang="en-US" dirty="0"/>
               <a:t>Software Architecture Preliminary Idea</a:t>
             </a:r>
+            <a:br>
+              <a:rPr lang="en-US" dirty="0"/>
+            </a:br>
+            <a:r>
+              <a:rPr lang="en-US" dirty="0"/>
+              <a:t>TO FINISH</a:t>
+            </a:r>
           </a:p>
         </p:txBody>
       </p:sp>
@@ -4929,7 +5155,7 @@
         <p:spPr>
           <a:xfrm>
             <a:off x="620486" y="1926770"/>
-            <a:ext cx="8180614" cy="646331"/>
+            <a:ext cx="8180614" cy="3970318"/>
           </a:xfrm>
           <a:prstGeom prst="rect">
             <a:avLst/>
@@ -4946,6 +5172,106 @@
               <a:rPr lang="en-US" dirty="0"/>
               <a:t>Include also the frameworks and tools that the group would like to use (programming languages, DBMSs, etc..)</a:t>
             </a:r>
+          </a:p>
+          <a:p>
+            <a:r>
+              <a:rPr lang="en-US" dirty="0"/>
+              <a:t>Programming languages:</a:t>
+            </a:r>
+          </a:p>
+          <a:p>
+            <a:pPr marL="285750" indent="-285750">
+              <a:buFont typeface="Arial" panose="020B0604020202020204" pitchFamily="34" charset="0"/>
+              <a:buChar char="•"/>
+            </a:pPr>
+            <a:r>
+              <a:rPr lang="en-US" dirty="0"/>
+              <a:t>Python</a:t>
+            </a:r>
+          </a:p>
+          <a:p>
+            <a:endParaRPr lang="en-US" dirty="0"/>
+          </a:p>
+          <a:p>
+            <a:r>
+              <a:rPr lang="en-US" dirty="0"/>
+              <a:t>DBMS:</a:t>
+            </a:r>
+          </a:p>
+          <a:p>
+            <a:pPr marL="285750" indent="-285750">
+              <a:buFont typeface="Arial" panose="020B0604020202020204" pitchFamily="34" charset="0"/>
+              <a:buChar char="•"/>
+            </a:pPr>
+            <a:r>
+              <a:rPr lang="en-US" dirty="0"/>
+              <a:t>MongoDB</a:t>
+            </a:r>
+          </a:p>
+          <a:p>
+            <a:pPr marL="285750" indent="-285750">
+              <a:buFont typeface="Arial" panose="020B0604020202020204" pitchFamily="34" charset="0"/>
+              <a:buChar char="•"/>
+            </a:pPr>
+            <a:r>
+              <a:rPr lang="en-US" dirty="0"/>
+              <a:t>Neo4j</a:t>
+            </a:r>
+          </a:p>
+          <a:p>
+            <a:pPr marL="285750" indent="-285750">
+              <a:buFont typeface="Arial" panose="020B0604020202020204" pitchFamily="34" charset="0"/>
+              <a:buChar char="•"/>
+            </a:pPr>
+            <a:endParaRPr lang="en-US" dirty="0"/>
+          </a:p>
+          <a:p>
+            <a:r>
+              <a:rPr lang="en-US" dirty="0"/>
+              <a:t>Tools for data analysis and preparation of the dataset:</a:t>
+            </a:r>
+          </a:p>
+          <a:p>
+            <a:pPr marL="285750" indent="-285750">
+              <a:buFont typeface="Arial" panose="020B0604020202020204" pitchFamily="34" charset="0"/>
+              <a:buChar char="•"/>
+            </a:pPr>
+            <a:r>
+              <a:rPr lang="en-US" dirty="0"/>
+              <a:t>Google </a:t>
+            </a:r>
+            <a:r>
+              <a:rPr lang="en-US" dirty="0" err="1"/>
+              <a:t>Colab</a:t>
+            </a:r>
+            <a:endParaRPr lang="en-US" dirty="0"/>
+          </a:p>
+          <a:p>
+            <a:pPr marL="285750" indent="-285750">
+              <a:buFont typeface="Arial" panose="020B0604020202020204" pitchFamily="34" charset="0"/>
+              <a:buChar char="•"/>
+            </a:pPr>
+            <a:r>
+              <a:rPr lang="en-US" dirty="0"/>
+              <a:t>Pandas library</a:t>
+            </a:r>
+          </a:p>
+          <a:p>
+            <a:pPr marL="285750" indent="-285750">
+              <a:buFont typeface="Arial" panose="020B0604020202020204" pitchFamily="34" charset="0"/>
+              <a:buChar char="•"/>
+            </a:pPr>
+            <a:r>
+              <a:rPr lang="en-US" dirty="0"/>
+              <a:t>Microsoft Excel</a:t>
+            </a:r>
+          </a:p>
+          <a:p>
+            <a:pPr marL="285750" indent="-285750">
+              <a:buFont typeface="Arial" panose="020B0604020202020204" pitchFamily="34" charset="0"/>
+              <a:buChar char="•"/>
+            </a:pPr>
+            <a:endParaRPr lang="en-US" dirty="0"/>
           </a:p>
         </p:txBody>
       </p:sp>

</xml_diff>

<commit_message>
add UserDocument changes in presentation
</commit_message>
<xml_diff>
--- a/Presentazione.pptx
+++ b/Presentazione.pptx
@@ -399,7 +399,7 @@
           <a:p>
             <a:fld id="{0EF95162-6873-F647-B392-BF6A1F606277}" type="datetimeFigureOut">
               <a:rPr lang="it-IT" smtClean="0"/>
-              <a:t>08/12/2022</a:t>
+              <a:t>13/12/2022</a:t>
             </a:fld>
             <a:endParaRPr lang="it-IT"/>
           </a:p>
@@ -853,7 +853,7 @@
           <a:p>
             <a:fld id="{2FDCBEE4-315A-8E42-835E-29A1DAE07625}" type="datetimeFigureOut">
               <a:rPr lang="it-IT" smtClean="0"/>
-              <a:t>08/12/2022</a:t>
+              <a:t>13/12/2022</a:t>
             </a:fld>
             <a:endParaRPr lang="it-IT"/>
           </a:p>
@@ -1045,7 +1045,7 @@
           <a:p>
             <a:fld id="{2FDCBEE4-315A-8E42-835E-29A1DAE07625}" type="datetimeFigureOut">
               <a:rPr lang="it-IT" smtClean="0"/>
-              <a:t>08/12/2022</a:t>
+              <a:t>13/12/2022</a:t>
             </a:fld>
             <a:endParaRPr lang="it-IT"/>
           </a:p>
@@ -1247,7 +1247,7 @@
           <a:p>
             <a:fld id="{2FDCBEE4-315A-8E42-835E-29A1DAE07625}" type="datetimeFigureOut">
               <a:rPr lang="it-IT" smtClean="0"/>
-              <a:t>08/12/2022</a:t>
+              <a:t>13/12/2022</a:t>
             </a:fld>
             <a:endParaRPr lang="it-IT"/>
           </a:p>
@@ -1439,7 +1439,7 @@
           <a:p>
             <a:fld id="{2FDCBEE4-315A-8E42-835E-29A1DAE07625}" type="datetimeFigureOut">
               <a:rPr lang="it-IT" smtClean="0"/>
-              <a:t>08/12/2022</a:t>
+              <a:t>13/12/2022</a:t>
             </a:fld>
             <a:endParaRPr lang="it-IT"/>
           </a:p>
@@ -1708,7 +1708,7 @@
           <a:p>
             <a:fld id="{2FDCBEE4-315A-8E42-835E-29A1DAE07625}" type="datetimeFigureOut">
               <a:rPr lang="it-IT" smtClean="0"/>
-              <a:t>08/12/2022</a:t>
+              <a:t>13/12/2022</a:t>
             </a:fld>
             <a:endParaRPr lang="it-IT"/>
           </a:p>
@@ -2017,7 +2017,7 @@
           <a:p>
             <a:fld id="{2FDCBEE4-315A-8E42-835E-29A1DAE07625}" type="datetimeFigureOut">
               <a:rPr lang="it-IT" smtClean="0"/>
-              <a:t>08/12/2022</a:t>
+              <a:t>13/12/2022</a:t>
             </a:fld>
             <a:endParaRPr lang="it-IT"/>
           </a:p>
@@ -2460,7 +2460,7 @@
           <a:p>
             <a:fld id="{2FDCBEE4-315A-8E42-835E-29A1DAE07625}" type="datetimeFigureOut">
               <a:rPr lang="it-IT" smtClean="0"/>
-              <a:t>08/12/2022</a:t>
+              <a:t>13/12/2022</a:t>
             </a:fld>
             <a:endParaRPr lang="it-IT"/>
           </a:p>
@@ -2601,7 +2601,7 @@
           <a:p>
             <a:fld id="{2FDCBEE4-315A-8E42-835E-29A1DAE07625}" type="datetimeFigureOut">
               <a:rPr lang="it-IT" smtClean="0"/>
-              <a:t>08/12/2022</a:t>
+              <a:t>13/12/2022</a:t>
             </a:fld>
             <a:endParaRPr lang="it-IT"/>
           </a:p>
@@ -2720,7 +2720,7 @@
           <a:p>
             <a:fld id="{2FDCBEE4-315A-8E42-835E-29A1DAE07625}" type="datetimeFigureOut">
               <a:rPr lang="it-IT" smtClean="0"/>
-              <a:t>08/12/2022</a:t>
+              <a:t>13/12/2022</a:t>
             </a:fld>
             <a:endParaRPr lang="it-IT"/>
           </a:p>
@@ -3019,7 +3019,7 @@
           <a:p>
             <a:fld id="{2FDCBEE4-315A-8E42-835E-29A1DAE07625}" type="datetimeFigureOut">
               <a:rPr lang="it-IT" smtClean="0"/>
-              <a:t>08/12/2022</a:t>
+              <a:t>13/12/2022</a:t>
             </a:fld>
             <a:endParaRPr lang="it-IT"/>
           </a:p>
@@ -3295,7 +3295,7 @@
           <a:p>
             <a:fld id="{2FDCBEE4-315A-8E42-835E-29A1DAE07625}" type="datetimeFigureOut">
               <a:rPr lang="it-IT" smtClean="0"/>
-              <a:t>08/12/2022</a:t>
+              <a:t>13/12/2022</a:t>
             </a:fld>
             <a:endParaRPr lang="it-IT"/>
           </a:p>
@@ -4911,10 +4911,10 @@
       </p:sp>
       <p:pic>
         <p:nvPicPr>
-          <p:cNvPr id="9" name="Picture 8">
+          <p:cNvPr id="11" name="Picture 10">
             <a:extLst>
               <a:ext uri="{FF2B5EF4-FFF2-40B4-BE49-F238E27FC236}">
-                <a16:creationId xmlns:a16="http://schemas.microsoft.com/office/drawing/2014/main" id="{72355D75-BB7B-30D1-1EA4-7C3BB692E05A}"/>
+                <a16:creationId xmlns:a16="http://schemas.microsoft.com/office/drawing/2014/main" id="{D8C2CDE3-9193-C986-DD7B-7BC2D664F990}"/>
               </a:ext>
             </a:extLst>
           </p:cNvPr>
@@ -4931,8 +4931,8 @@
         </p:blipFill>
         <p:spPr>
           <a:xfrm>
-            <a:off x="771525" y="1870916"/>
-            <a:ext cx="1922646" cy="2113954"/>
+            <a:off x="5034180" y="1580504"/>
+            <a:ext cx="2660832" cy="2667000"/>
           </a:xfrm>
           <a:prstGeom prst="rect">
             <a:avLst/>
@@ -4941,10 +4941,10 @@
       </p:pic>
       <p:pic>
         <p:nvPicPr>
-          <p:cNvPr id="11" name="Picture 10">
+          <p:cNvPr id="5" name="Immagine 4">
             <a:extLst>
               <a:ext uri="{FF2B5EF4-FFF2-40B4-BE49-F238E27FC236}">
-                <a16:creationId xmlns:a16="http://schemas.microsoft.com/office/drawing/2014/main" id="{D8C2CDE3-9193-C986-DD7B-7BC2D664F990}"/>
+                <a16:creationId xmlns:a16="http://schemas.microsoft.com/office/drawing/2014/main" id="{638A9382-F5C8-65E5-4CC3-6999D952FA2A}"/>
               </a:ext>
             </a:extLst>
           </p:cNvPr>
@@ -4961,8 +4961,8 @@
         </p:blipFill>
         <p:spPr>
           <a:xfrm>
-            <a:off x="4202907" y="1594393"/>
-            <a:ext cx="2660832" cy="2667000"/>
+            <a:off x="1685963" y="1752888"/>
+            <a:ext cx="2195351" cy="2412712"/>
           </a:xfrm>
           <a:prstGeom prst="rect">
             <a:avLst/>

</xml_diff>

<commit_message>
fix typos in presentation and diagrams
</commit_message>
<xml_diff>
--- a/Presentazione.pptx
+++ b/Presentazione.pptx
@@ -4126,7 +4126,7 @@
           <a:p>
             <a:r>
               <a:rPr lang="en-US" sz="2000" i="1" dirty="0"/>
-              <a:t>Rotten Movies is a hub to find information and reviews about movies written by everyone, from press &amp; top critics to any movie enthusiast:</a:t>
+              <a:t>Rotten Movies is a hub to find information and reviews about movies written by everyone, from press and top critics to any movie enthusiast:</a:t>
             </a:r>
           </a:p>
           <a:p>
@@ -4157,7 +4157,7 @@
             </a:br>
             <a:r>
               <a:rPr lang="en-US" sz="2000" i="1" dirty="0"/>
-              <a:t>- cast and crew with relative roles</a:t>
+              <a:t>- cast and crew members with relative roles</a:t>
             </a:r>
             <a:br>
               <a:rPr lang="en-US" sz="2000" i="1" dirty="0"/>
@@ -4171,7 +4171,7 @@
             </a:br>
             <a:r>
               <a:rPr lang="en-US" sz="2000" i="1" dirty="0"/>
-              <a:t>- votes of the critics and of the public</a:t>
+              <a:t>- votes from the critics and from the public</a:t>
             </a:r>
           </a:p>
           <a:p>
@@ -4181,7 +4181,7 @@
             </a:pPr>
             <a:r>
               <a:rPr lang="en-US" sz="2000" i="1" dirty="0"/>
-              <a:t>Registered user are divided between normal one and top critics</a:t>
+              <a:t>Registered users are divided between normal and top critics</a:t>
             </a:r>
           </a:p>
           <a:p>
@@ -4330,10 +4330,10 @@
       </p:sp>
       <p:pic>
         <p:nvPicPr>
-          <p:cNvPr id="8" name="Immagine 7">
+          <p:cNvPr id="4" name="Immagine 3">
             <a:extLst>
               <a:ext uri="{FF2B5EF4-FFF2-40B4-BE49-F238E27FC236}">
-                <a16:creationId xmlns:a16="http://schemas.microsoft.com/office/drawing/2014/main" id="{5FF8B0BC-A4AA-0DFE-15B3-C3EF9FB17DEE}"/>
+                <a16:creationId xmlns:a16="http://schemas.microsoft.com/office/drawing/2014/main" id="{DE422EDF-E899-F94E-8A5B-37EDB5559699}"/>
               </a:ext>
             </a:extLst>
           </p:cNvPr>
@@ -4350,8 +4350,8 @@
         </p:blipFill>
         <p:spPr>
           <a:xfrm>
-            <a:off x="385695" y="459367"/>
-            <a:ext cx="8394278" cy="6032440"/>
+            <a:off x="715052" y="437609"/>
+            <a:ext cx="8229486" cy="6063819"/>
           </a:xfrm>
           <a:prstGeom prst="rect">
             <a:avLst/>
@@ -4584,7 +4584,7 @@
             </a:pPr>
             <a:r>
               <a:rPr lang="en-US" sz="2000" dirty="0"/>
-              <a:t>basic information about the movies like title, cast and crew with roles, year of release, runtime and production houses</a:t>
+              <a:t>basic information about movies like title, cast and crew with roles, year of release, runtime and production houses</a:t>
             </a:r>
           </a:p>
           <a:p>
@@ -4604,7 +4604,7 @@
             </a:pPr>
             <a:r>
               <a:rPr lang="en-US" sz="2000" dirty="0"/>
-              <a:t>reviews and scores for movies divided between top critics and audience</a:t>
+              <a:t>reviews and ratings for movies divided between top critics and audience</a:t>
             </a:r>
             <a:endParaRPr lang="en-US" sz="2000" b="1" i="1" dirty="0"/>
           </a:p>
@@ -4628,7 +4628,7 @@
             </a:r>
             <a:r>
               <a:rPr lang="en-US" sz="2000" dirty="0"/>
-              <a:t>: IMDB’s dataset is used to retrieve information about films and Rotten Tomatoes’ is used to obtain the reviews about the movies</a:t>
+              <a:t>: IMDB’s dataset is used to retrieve information about films and Rotten Tomatoes’ is used to obtain the reviews about movies</a:t>
             </a:r>
           </a:p>
           <a:p>
@@ -4867,7 +4867,7 @@
             </a:pPr>
             <a:r>
               <a:rPr lang="en-US" sz="2000" dirty="0"/>
-              <a:t>Most positive reviewed movies for each genres</a:t>
+              <a:t>Most positive reviewed movies for each genre</a:t>
             </a:r>
           </a:p>
           <a:p>
@@ -4897,7 +4897,7 @@
             </a:pPr>
             <a:r>
               <a:rPr lang="en-US" sz="2000" dirty="0"/>
-              <a:t>Most active users in terms of review</a:t>
+              <a:t>Most active users in terms of reviews</a:t>
             </a:r>
           </a:p>
           <a:p>
@@ -5050,8 +5050,8 @@
         </p:nvSpPr>
         <p:spPr>
           <a:xfrm>
-            <a:off x="397486" y="1642016"/>
-            <a:ext cx="3031514" cy="3785652"/>
+            <a:off x="397485" y="1642016"/>
+            <a:ext cx="3121437" cy="3785652"/>
           </a:xfrm>
           <a:prstGeom prst="rect">
             <a:avLst/>
@@ -5146,7 +5146,7 @@
             </a:pPr>
             <a:r>
               <a:rPr lang="en-US" sz="2000" dirty="0"/>
-              <a:t>Most followed top critic</a:t>
+              <a:t>Most followed top critics</a:t>
             </a:r>
           </a:p>
           <a:p>
@@ -5156,7 +5156,7 @@
             </a:pPr>
             <a:r>
               <a:rPr lang="en-US" sz="2000" dirty="0"/>
-              <a:t>Last reviews of followed top critic</a:t>
+              <a:t>Last reviews of followed top critics</a:t>
             </a:r>
           </a:p>
           <a:p>
@@ -5166,7 +5166,7 @@
             </a:pPr>
             <a:r>
               <a:rPr lang="en-US" sz="2000" dirty="0"/>
-              <a:t>Suggest critic to follow based on affinity</a:t>
+              <a:t>Suggest critics to follow based on affinity</a:t>
             </a:r>
           </a:p>
         </p:txBody>
@@ -5193,8 +5193,8 @@
         </p:blipFill>
         <p:spPr>
           <a:xfrm>
-            <a:off x="3134311" y="1382434"/>
-            <a:ext cx="5896133" cy="4194498"/>
+            <a:off x="3267572" y="1382434"/>
+            <a:ext cx="5762872" cy="4194498"/>
           </a:xfrm>
           <a:prstGeom prst="rect">
             <a:avLst/>

</xml_diff>

<commit_message>
add script to presentation notes
</commit_message>
<xml_diff>
--- a/Presentazione.pptx
+++ b/Presentazione.pptx
@@ -666,6 +666,1107 @@
 </p:notesMaster>
 </file>
 
+<file path=ppt/notesSlides/notesSlide1.xml><?xml version="1.0" encoding="utf-8"?>
+<p:notes xmlns:a="http://schemas.openxmlformats.org/drawingml/2006/main" xmlns:r="http://schemas.openxmlformats.org/officeDocument/2006/relationships" xmlns:p="http://schemas.openxmlformats.org/presentationml/2006/main">
+  <p:cSld>
+    <p:spTree>
+      <p:nvGrpSpPr>
+        <p:cNvPr id="1" name=""/>
+        <p:cNvGrpSpPr/>
+        <p:nvPr/>
+      </p:nvGrpSpPr>
+      <p:grpSpPr>
+        <a:xfrm>
+          <a:off x="0" y="0"/>
+          <a:ext cx="0" cy="0"/>
+          <a:chOff x="0" y="0"/>
+          <a:chExt cx="0" cy="0"/>
+        </a:xfrm>
+      </p:grpSpPr>
+      <p:sp>
+        <p:nvSpPr>
+          <p:cNvPr id="2" name="Segnaposto immagine diapositiva 1"/>
+          <p:cNvSpPr>
+            <a:spLocks noGrp="1" noRot="1" noChangeAspect="1"/>
+          </p:cNvSpPr>
+          <p:nvPr>
+            <p:ph type="sldImg"/>
+          </p:nvPr>
+        </p:nvSpPr>
+        <p:spPr/>
+      </p:sp>
+      <p:sp>
+        <p:nvSpPr>
+          <p:cNvPr id="3" name="Segnaposto note 2"/>
+          <p:cNvSpPr>
+            <a:spLocks noGrp="1"/>
+          </p:cNvSpPr>
+          <p:nvPr>
+            <p:ph type="body" idx="1"/>
+          </p:nvPr>
+        </p:nvSpPr>
+        <p:spPr/>
+        <p:txBody>
+          <a:bodyPr/>
+          <a:lstStyle/>
+          <a:p>
+            <a:r>
+              <a:rPr lang="en-US" dirty="0"/>
+              <a:t>hi everyone!</a:t>
+            </a:r>
+          </a:p>
+          <a:p>
+            <a:r>
+              <a:rPr lang="en-US" dirty="0"/>
+              <a:t>our project is called Rotten Movies.</a:t>
+            </a:r>
+          </a:p>
+          <a:p>
+            <a:r>
+              <a:rPr lang="en-US" dirty="0"/>
+              <a:t>It takes inspiration from Rotten Tomatoes</a:t>
+            </a:r>
+            <a:endParaRPr lang="it-IT" dirty="0"/>
+          </a:p>
+        </p:txBody>
+      </p:sp>
+      <p:sp>
+        <p:nvSpPr>
+          <p:cNvPr id="4" name="Segnaposto numero diapositiva 3"/>
+          <p:cNvSpPr>
+            <a:spLocks noGrp="1"/>
+          </p:cNvSpPr>
+          <p:nvPr>
+            <p:ph type="sldNum" sz="quarter" idx="5"/>
+          </p:nvPr>
+        </p:nvSpPr>
+        <p:spPr/>
+        <p:txBody>
+          <a:bodyPr/>
+          <a:lstStyle/>
+          <a:p>
+            <a:fld id="{60FDF8BA-B6A2-CC4D-B552-37BF044E1040}" type="slidenum">
+              <a:rPr lang="it-IT" smtClean="0"/>
+              <a:t>1</a:t>
+            </a:fld>
+            <a:endParaRPr lang="it-IT"/>
+          </a:p>
+        </p:txBody>
+      </p:sp>
+    </p:spTree>
+    <p:extLst>
+      <p:ext uri="{BB962C8B-B14F-4D97-AF65-F5344CB8AC3E}">
+        <p14:creationId xmlns:p14="http://schemas.microsoft.com/office/powerpoint/2010/main" val="1177854311"/>
+      </p:ext>
+    </p:extLst>
+  </p:cSld>
+  <p:clrMapOvr>
+    <a:masterClrMapping/>
+  </p:clrMapOvr>
+</p:notes>
+</file>
+
+<file path=ppt/notesSlides/notesSlide2.xml><?xml version="1.0" encoding="utf-8"?>
+<p:notes xmlns:a="http://schemas.openxmlformats.org/drawingml/2006/main" xmlns:r="http://schemas.openxmlformats.org/officeDocument/2006/relationships" xmlns:p="http://schemas.openxmlformats.org/presentationml/2006/main">
+  <p:cSld>
+    <p:spTree>
+      <p:nvGrpSpPr>
+        <p:cNvPr id="1" name=""/>
+        <p:cNvGrpSpPr/>
+        <p:nvPr/>
+      </p:nvGrpSpPr>
+      <p:grpSpPr>
+        <a:xfrm>
+          <a:off x="0" y="0"/>
+          <a:ext cx="0" cy="0"/>
+          <a:chOff x="0" y="0"/>
+          <a:chExt cx="0" cy="0"/>
+        </a:xfrm>
+      </p:grpSpPr>
+      <p:sp>
+        <p:nvSpPr>
+          <p:cNvPr id="2" name="Segnaposto immagine diapositiva 1"/>
+          <p:cNvSpPr>
+            <a:spLocks noGrp="1" noRot="1" noChangeAspect="1"/>
+          </p:cNvSpPr>
+          <p:nvPr>
+            <p:ph type="sldImg"/>
+          </p:nvPr>
+        </p:nvSpPr>
+        <p:spPr/>
+      </p:sp>
+      <p:sp>
+        <p:nvSpPr>
+          <p:cNvPr id="3" name="Segnaposto note 2"/>
+          <p:cNvSpPr>
+            <a:spLocks noGrp="1"/>
+          </p:cNvSpPr>
+          <p:nvPr>
+            <p:ph type="body" idx="1"/>
+          </p:nvPr>
+        </p:nvSpPr>
+        <p:spPr/>
+        <p:txBody>
+          <a:bodyPr/>
+          <a:lstStyle/>
+          <a:p>
+            <a:r>
+              <a:rPr lang="en-US" dirty="0"/>
+              <a:t>For those that don't know it, it's a platform where users can read and write reviews about the latest movies.</a:t>
+            </a:r>
+          </a:p>
+          <a:p>
+            <a:endParaRPr lang="en-US" dirty="0"/>
+          </a:p>
+          <a:p>
+            <a:r>
+              <a:rPr lang="en-US" dirty="0"/>
+              <a:t>So, our application should allow unregistered users to browse movies and see their details, like plot, genre, cast.. and read all the associated reviews.</a:t>
+            </a:r>
+          </a:p>
+          <a:p>
+            <a:endParaRPr lang="en-US" dirty="0"/>
+          </a:p>
+          <a:p>
+            <a:r>
+              <a:rPr lang="en-US" dirty="0"/>
+              <a:t>Those reviews come from other registered users or top critic reviewers and the aggregated general rating is kept separated between these two groups, in order to highlight possible alignments or disagreements between top critics and the audience.</a:t>
+            </a:r>
+          </a:p>
+          <a:p>
+            <a:endParaRPr lang="en-US" dirty="0"/>
+          </a:p>
+          <a:p>
+            <a:r>
+              <a:rPr lang="en-US" dirty="0"/>
+              <a:t>Registered users can "follow" a top critic reviewer that they find interesting to keep track with their recent updates: this is because all recent reviews written by followed top critic appear in a feed timeline of a registered user.</a:t>
+            </a:r>
+            <a:endParaRPr lang="it-IT" dirty="0"/>
+          </a:p>
+        </p:txBody>
+      </p:sp>
+      <p:sp>
+        <p:nvSpPr>
+          <p:cNvPr id="4" name="Segnaposto numero diapositiva 3"/>
+          <p:cNvSpPr>
+            <a:spLocks noGrp="1"/>
+          </p:cNvSpPr>
+          <p:nvPr>
+            <p:ph type="sldNum" sz="quarter" idx="5"/>
+          </p:nvPr>
+        </p:nvSpPr>
+        <p:spPr/>
+        <p:txBody>
+          <a:bodyPr/>
+          <a:lstStyle/>
+          <a:p>
+            <a:fld id="{60FDF8BA-B6A2-CC4D-B552-37BF044E1040}" type="slidenum">
+              <a:rPr lang="it-IT" smtClean="0"/>
+              <a:t>2</a:t>
+            </a:fld>
+            <a:endParaRPr lang="it-IT"/>
+          </a:p>
+        </p:txBody>
+      </p:sp>
+    </p:spTree>
+    <p:extLst>
+      <p:ext uri="{BB962C8B-B14F-4D97-AF65-F5344CB8AC3E}">
+        <p14:creationId xmlns:p14="http://schemas.microsoft.com/office/powerpoint/2010/main" val="2004604914"/>
+      </p:ext>
+    </p:extLst>
+  </p:cSld>
+  <p:clrMapOvr>
+    <a:masterClrMapping/>
+  </p:clrMapOvr>
+</p:notes>
+</file>
+
+<file path=ppt/notesSlides/notesSlide3.xml><?xml version="1.0" encoding="utf-8"?>
+<p:notes xmlns:a="http://schemas.openxmlformats.org/drawingml/2006/main" xmlns:r="http://schemas.openxmlformats.org/officeDocument/2006/relationships" xmlns:p="http://schemas.openxmlformats.org/presentationml/2006/main">
+  <p:cSld>
+    <p:spTree>
+      <p:nvGrpSpPr>
+        <p:cNvPr id="1" name=""/>
+        <p:cNvGrpSpPr/>
+        <p:nvPr/>
+      </p:nvGrpSpPr>
+      <p:grpSpPr>
+        <a:xfrm>
+          <a:off x="0" y="0"/>
+          <a:ext cx="0" cy="0"/>
+          <a:chOff x="0" y="0"/>
+          <a:chExt cx="0" cy="0"/>
+        </a:xfrm>
+      </p:grpSpPr>
+      <p:sp>
+        <p:nvSpPr>
+          <p:cNvPr id="2" name="Segnaposto immagine diapositiva 1"/>
+          <p:cNvSpPr>
+            <a:spLocks noGrp="1" noRot="1" noChangeAspect="1"/>
+          </p:cNvSpPr>
+          <p:nvPr>
+            <p:ph type="sldImg"/>
+          </p:nvPr>
+        </p:nvSpPr>
+        <p:spPr/>
+      </p:sp>
+      <p:sp>
+        <p:nvSpPr>
+          <p:cNvPr id="3" name="Segnaposto note 2"/>
+          <p:cNvSpPr>
+            <a:spLocks noGrp="1"/>
+          </p:cNvSpPr>
+          <p:nvPr>
+            <p:ph type="body" idx="1"/>
+          </p:nvPr>
+        </p:nvSpPr>
+        <p:spPr/>
+        <p:txBody>
+          <a:bodyPr/>
+          <a:lstStyle/>
+          <a:p>
+            <a:r>
+              <a:rPr lang="en-US" dirty="0"/>
+              <a:t>This is the general use case diagram.</a:t>
+            </a:r>
+          </a:p>
+          <a:p>
+            <a:endParaRPr lang="en-US" dirty="0"/>
+          </a:p>
+          <a:p>
+            <a:r>
+              <a:rPr lang="en-US" dirty="0"/>
+              <a:t>It is a </a:t>
+            </a:r>
+            <a:r>
+              <a:rPr lang="en-US" dirty="0" err="1"/>
+              <a:t>simplifyied</a:t>
+            </a:r>
+            <a:r>
+              <a:rPr lang="en-US" dirty="0"/>
+              <a:t> version: the final one that we'll present at the exam may include some additional use case that we didn't include here for readability, but all major use cases of the application are already present.</a:t>
+            </a:r>
+          </a:p>
+          <a:p>
+            <a:endParaRPr lang="en-US" dirty="0"/>
+          </a:p>
+          <a:p>
+            <a:r>
+              <a:rPr lang="en-US" dirty="0"/>
+              <a:t>We can clearly see that we have 4 main actors, 2 of which are derived from a common abstract parent class.</a:t>
+            </a:r>
+          </a:p>
+          <a:p>
+            <a:endParaRPr lang="en-US" dirty="0"/>
+          </a:p>
+          <a:p>
+            <a:r>
+              <a:rPr lang="en-US" dirty="0"/>
+              <a:t>Those are:</a:t>
+            </a:r>
+          </a:p>
+          <a:p>
+            <a:r>
+              <a:rPr lang="en-US" dirty="0"/>
+              <a:t>- the unregistered user</a:t>
+            </a:r>
+          </a:p>
+          <a:p>
+            <a:r>
+              <a:rPr lang="en-US" dirty="0"/>
+              <a:t>	- that can only browse movies and read reviews</a:t>
+            </a:r>
+          </a:p>
+          <a:p>
+            <a:r>
+              <a:rPr lang="en-US" dirty="0"/>
+              <a:t>	- and hopefully may register or login to the platform so that it becomes a..</a:t>
+            </a:r>
+          </a:p>
+          <a:p>
+            <a:r>
+              <a:rPr lang="en-US" dirty="0"/>
+              <a:t>- registered user</a:t>
+            </a:r>
+          </a:p>
+          <a:p>
+            <a:r>
+              <a:rPr lang="en-US" dirty="0"/>
+              <a:t>	- that can also leave reviews of a selected movie </a:t>
+            </a:r>
+          </a:p>
+          <a:p>
+            <a:r>
+              <a:rPr lang="en-US" dirty="0"/>
+              <a:t>	- and follow top critic reviewers, so that it can see their recent reviews in its timeline.</a:t>
+            </a:r>
+          </a:p>
+          <a:p>
+            <a:r>
+              <a:rPr lang="en-US" dirty="0"/>
+              <a:t>- We also have a top critic account that is a special type of registered user </a:t>
+            </a:r>
+          </a:p>
+          <a:p>
+            <a:r>
+              <a:rPr lang="en-US" dirty="0"/>
+              <a:t>	- whose reviews get highlighted.</a:t>
+            </a:r>
+          </a:p>
+          <a:p>
+            <a:r>
+              <a:rPr lang="en-US" dirty="0"/>
+              <a:t>	- It can also be followed by normal users but it can't follow back other users nor top critics.</a:t>
+            </a:r>
+          </a:p>
+          <a:p>
+            <a:r>
+              <a:rPr lang="en-US" dirty="0"/>
+              <a:t>	- Here we added a simple analytic for top critic users about their follower count.</a:t>
+            </a:r>
+          </a:p>
+          <a:p>
+            <a:r>
+              <a:rPr lang="en-US" dirty="0"/>
+              <a:t>- Finally we have an admin user</a:t>
+            </a:r>
+          </a:p>
+          <a:p>
+            <a:r>
+              <a:rPr lang="en-US" dirty="0"/>
+              <a:t>	- whose job consists in adding, removing and modifying movies and their details.</a:t>
+            </a:r>
+          </a:p>
+          <a:p>
+            <a:r>
+              <a:rPr lang="en-US" dirty="0"/>
+              <a:t>	- It can also ban users or eliminate reviews they find inappropriate.</a:t>
+            </a:r>
+          </a:p>
+          <a:p>
+            <a:r>
+              <a:rPr lang="en-US" dirty="0"/>
+              <a:t>	- They're responsible for creating new top critic accounts for verified reviewers that requested it.</a:t>
+            </a:r>
+          </a:p>
+          <a:p>
+            <a:r>
+              <a:rPr lang="en-US" dirty="0"/>
+              <a:t>	- They also have access to some global analytic for the application: like the list of the most active accounts</a:t>
+            </a:r>
+          </a:p>
+          <a:p>
+            <a:endParaRPr lang="it-IT" dirty="0"/>
+          </a:p>
+        </p:txBody>
+      </p:sp>
+      <p:sp>
+        <p:nvSpPr>
+          <p:cNvPr id="4" name="Segnaposto numero diapositiva 3"/>
+          <p:cNvSpPr>
+            <a:spLocks noGrp="1"/>
+          </p:cNvSpPr>
+          <p:nvPr>
+            <p:ph type="sldNum" sz="quarter" idx="5"/>
+          </p:nvPr>
+        </p:nvSpPr>
+        <p:spPr/>
+        <p:txBody>
+          <a:bodyPr/>
+          <a:lstStyle/>
+          <a:p>
+            <a:fld id="{60FDF8BA-B6A2-CC4D-B552-37BF044E1040}" type="slidenum">
+              <a:rPr lang="it-IT" smtClean="0"/>
+              <a:t>3</a:t>
+            </a:fld>
+            <a:endParaRPr lang="it-IT"/>
+          </a:p>
+        </p:txBody>
+      </p:sp>
+    </p:spTree>
+    <p:extLst>
+      <p:ext uri="{BB962C8B-B14F-4D97-AF65-F5344CB8AC3E}">
+        <p14:creationId xmlns:p14="http://schemas.microsoft.com/office/powerpoint/2010/main" val="2951404493"/>
+      </p:ext>
+    </p:extLst>
+  </p:cSld>
+  <p:clrMapOvr>
+    <a:masterClrMapping/>
+  </p:clrMapOvr>
+</p:notes>
+</file>
+
+<file path=ppt/notesSlides/notesSlide4.xml><?xml version="1.0" encoding="utf-8"?>
+<p:notes xmlns:a="http://schemas.openxmlformats.org/drawingml/2006/main" xmlns:r="http://schemas.openxmlformats.org/officeDocument/2006/relationships" xmlns:p="http://schemas.openxmlformats.org/presentationml/2006/main">
+  <p:cSld>
+    <p:spTree>
+      <p:nvGrpSpPr>
+        <p:cNvPr id="1" name=""/>
+        <p:cNvGrpSpPr/>
+        <p:nvPr/>
+      </p:nvGrpSpPr>
+      <p:grpSpPr>
+        <a:xfrm>
+          <a:off x="0" y="0"/>
+          <a:ext cx="0" cy="0"/>
+          <a:chOff x="0" y="0"/>
+          <a:chExt cx="0" cy="0"/>
+        </a:xfrm>
+      </p:grpSpPr>
+      <p:sp>
+        <p:nvSpPr>
+          <p:cNvPr id="2" name="Segnaposto immagine diapositiva 1"/>
+          <p:cNvSpPr>
+            <a:spLocks noGrp="1" noRot="1" noChangeAspect="1"/>
+          </p:cNvSpPr>
+          <p:nvPr>
+            <p:ph type="sldImg"/>
+          </p:nvPr>
+        </p:nvSpPr>
+        <p:spPr/>
+      </p:sp>
+      <p:sp>
+        <p:nvSpPr>
+          <p:cNvPr id="3" name="Segnaposto note 2"/>
+          <p:cNvSpPr>
+            <a:spLocks noGrp="1"/>
+          </p:cNvSpPr>
+          <p:nvPr>
+            <p:ph type="body" idx="1"/>
+          </p:nvPr>
+        </p:nvSpPr>
+        <p:spPr/>
+        <p:txBody>
+          <a:bodyPr/>
+          <a:lstStyle/>
+          <a:p>
+            <a:r>
+              <a:rPr lang="en-US" dirty="0"/>
+              <a:t>Our dataset merges information from 3 different primary sources:</a:t>
+            </a:r>
+          </a:p>
+          <a:p>
+            <a:r>
+              <a:rPr lang="en-US" dirty="0"/>
+              <a:t>- first one is IMDB for everything related to movies and their cast,</a:t>
+            </a:r>
+          </a:p>
+          <a:p>
+            <a:r>
+              <a:rPr lang="en-US" dirty="0"/>
+              <a:t>- then we tried to overlap it with reviews found on Rotten Tomatoes,</a:t>
+            </a:r>
+          </a:p>
+          <a:p>
+            <a:r>
+              <a:rPr lang="en-US" dirty="0"/>
+              <a:t>- finally users </a:t>
+            </a:r>
+            <a:r>
+              <a:rPr lang="en-US" dirty="0" err="1"/>
+              <a:t>informations</a:t>
+            </a:r>
+            <a:r>
+              <a:rPr lang="en-US" dirty="0"/>
+              <a:t> have been randomly generated starting from usernames found in the reviews.</a:t>
+            </a:r>
+          </a:p>
+          <a:p>
+            <a:endParaRPr lang="en-US" dirty="0"/>
+          </a:p>
+          <a:p>
+            <a:r>
+              <a:rPr lang="en-US" dirty="0"/>
+              <a:t>Volume exceeds the 250MB, excluding the generated user information, and with the different data sources we tried to comply to the variety requirement of the assignment.</a:t>
+            </a:r>
+            <a:endParaRPr lang="it-IT" dirty="0"/>
+          </a:p>
+        </p:txBody>
+      </p:sp>
+      <p:sp>
+        <p:nvSpPr>
+          <p:cNvPr id="4" name="Segnaposto numero diapositiva 3"/>
+          <p:cNvSpPr>
+            <a:spLocks noGrp="1"/>
+          </p:cNvSpPr>
+          <p:nvPr>
+            <p:ph type="sldNum" sz="quarter" idx="5"/>
+          </p:nvPr>
+        </p:nvSpPr>
+        <p:spPr/>
+        <p:txBody>
+          <a:bodyPr/>
+          <a:lstStyle/>
+          <a:p>
+            <a:fld id="{60FDF8BA-B6A2-CC4D-B552-37BF044E1040}" type="slidenum">
+              <a:rPr lang="it-IT" smtClean="0"/>
+              <a:t>4</a:t>
+            </a:fld>
+            <a:endParaRPr lang="it-IT"/>
+          </a:p>
+        </p:txBody>
+      </p:sp>
+    </p:spTree>
+    <p:extLst>
+      <p:ext uri="{BB962C8B-B14F-4D97-AF65-F5344CB8AC3E}">
+        <p14:creationId xmlns:p14="http://schemas.microsoft.com/office/powerpoint/2010/main" val="2018701183"/>
+      </p:ext>
+    </p:extLst>
+  </p:cSld>
+  <p:clrMapOvr>
+    <a:masterClrMapping/>
+  </p:clrMapOvr>
+</p:notes>
+</file>
+
+<file path=ppt/notesSlides/notesSlide5.xml><?xml version="1.0" encoding="utf-8"?>
+<p:notes xmlns:a="http://schemas.openxmlformats.org/drawingml/2006/main" xmlns:r="http://schemas.openxmlformats.org/officeDocument/2006/relationships" xmlns:p="http://schemas.openxmlformats.org/presentationml/2006/main">
+  <p:cSld>
+    <p:spTree>
+      <p:nvGrpSpPr>
+        <p:cNvPr id="1" name=""/>
+        <p:cNvGrpSpPr/>
+        <p:nvPr/>
+      </p:nvGrpSpPr>
+      <p:grpSpPr>
+        <a:xfrm>
+          <a:off x="0" y="0"/>
+          <a:ext cx="0" cy="0"/>
+          <a:chOff x="0" y="0"/>
+          <a:chExt cx="0" cy="0"/>
+        </a:xfrm>
+      </p:grpSpPr>
+      <p:sp>
+        <p:nvSpPr>
+          <p:cNvPr id="2" name="Segnaposto immagine diapositiva 1"/>
+          <p:cNvSpPr>
+            <a:spLocks noGrp="1" noRot="1" noChangeAspect="1"/>
+          </p:cNvSpPr>
+          <p:nvPr>
+            <p:ph type="sldImg"/>
+          </p:nvPr>
+        </p:nvSpPr>
+        <p:spPr/>
+      </p:sp>
+      <p:sp>
+        <p:nvSpPr>
+          <p:cNvPr id="3" name="Segnaposto note 2"/>
+          <p:cNvSpPr>
+            <a:spLocks noGrp="1"/>
+          </p:cNvSpPr>
+          <p:nvPr>
+            <p:ph type="body" idx="1"/>
+          </p:nvPr>
+        </p:nvSpPr>
+        <p:spPr/>
+        <p:txBody>
+          <a:bodyPr/>
+          <a:lstStyle/>
+          <a:p>
+            <a:r>
+              <a:rPr lang="en-US" dirty="0"/>
+              <a:t>This's the preliminary UML Class Diagram, where we highlighted the most important fields for each class and their relationships with each other.</a:t>
+            </a:r>
+          </a:p>
+          <a:p>
+            <a:endParaRPr lang="en-US" dirty="0"/>
+          </a:p>
+          <a:p>
+            <a:r>
+              <a:rPr lang="en-US" dirty="0"/>
+              <a:t>We can also see the abstract classes from which are derived the concrete implementations that will be used.</a:t>
+            </a:r>
+            <a:endParaRPr lang="it-IT" dirty="0"/>
+          </a:p>
+        </p:txBody>
+      </p:sp>
+      <p:sp>
+        <p:nvSpPr>
+          <p:cNvPr id="4" name="Segnaposto numero diapositiva 3"/>
+          <p:cNvSpPr>
+            <a:spLocks noGrp="1"/>
+          </p:cNvSpPr>
+          <p:nvPr>
+            <p:ph type="sldNum" sz="quarter" idx="5"/>
+          </p:nvPr>
+        </p:nvSpPr>
+        <p:spPr/>
+        <p:txBody>
+          <a:bodyPr/>
+          <a:lstStyle/>
+          <a:p>
+            <a:fld id="{60FDF8BA-B6A2-CC4D-B552-37BF044E1040}" type="slidenum">
+              <a:rPr lang="it-IT" smtClean="0"/>
+              <a:t>5</a:t>
+            </a:fld>
+            <a:endParaRPr lang="it-IT"/>
+          </a:p>
+        </p:txBody>
+      </p:sp>
+    </p:spTree>
+    <p:extLst>
+      <p:ext uri="{BB962C8B-B14F-4D97-AF65-F5344CB8AC3E}">
+        <p14:creationId xmlns:p14="http://schemas.microsoft.com/office/powerpoint/2010/main" val="1110026548"/>
+      </p:ext>
+    </p:extLst>
+  </p:cSld>
+  <p:clrMapOvr>
+    <a:masterClrMapping/>
+  </p:clrMapOvr>
+</p:notes>
+</file>
+
+<file path=ppt/notesSlides/notesSlide6.xml><?xml version="1.0" encoding="utf-8"?>
+<p:notes xmlns:a="http://schemas.openxmlformats.org/drawingml/2006/main" xmlns:r="http://schemas.openxmlformats.org/officeDocument/2006/relationships" xmlns:p="http://schemas.openxmlformats.org/presentationml/2006/main">
+  <p:cSld>
+    <p:spTree>
+      <p:nvGrpSpPr>
+        <p:cNvPr id="1" name=""/>
+        <p:cNvGrpSpPr/>
+        <p:nvPr/>
+      </p:nvGrpSpPr>
+      <p:grpSpPr>
+        <a:xfrm>
+          <a:off x="0" y="0"/>
+          <a:ext cx="0" cy="0"/>
+          <a:chOff x="0" y="0"/>
+          <a:chExt cx="0" cy="0"/>
+        </a:xfrm>
+      </p:grpSpPr>
+      <p:sp>
+        <p:nvSpPr>
+          <p:cNvPr id="2" name="Segnaposto immagine diapositiva 1"/>
+          <p:cNvSpPr>
+            <a:spLocks noGrp="1" noRot="1" noChangeAspect="1"/>
+          </p:cNvSpPr>
+          <p:nvPr>
+            <p:ph type="sldImg"/>
+          </p:nvPr>
+        </p:nvSpPr>
+        <p:spPr/>
+      </p:sp>
+      <p:sp>
+        <p:nvSpPr>
+          <p:cNvPr id="3" name="Segnaposto note 2"/>
+          <p:cNvSpPr>
+            <a:spLocks noGrp="1"/>
+          </p:cNvSpPr>
+          <p:nvPr>
+            <p:ph type="body" idx="1"/>
+          </p:nvPr>
+        </p:nvSpPr>
+        <p:spPr/>
+        <p:txBody>
+          <a:bodyPr/>
+          <a:lstStyle/>
+          <a:p>
+            <a:r>
+              <a:rPr lang="en-US" dirty="0"/>
+              <a:t>Here we can see the 2 main collections used in the document db.</a:t>
+            </a:r>
+          </a:p>
+          <a:p>
+            <a:endParaRPr lang="en-US" dirty="0"/>
+          </a:p>
+          <a:p>
+            <a:r>
+              <a:rPr lang="en-US" dirty="0"/>
+              <a:t>We implemented document embedding for the cast and reviews for each movie</a:t>
+            </a:r>
+          </a:p>
+          <a:p>
+            <a:endParaRPr lang="en-US" dirty="0"/>
+          </a:p>
+          <a:p>
+            <a:r>
+              <a:rPr lang="en-US" dirty="0"/>
+              <a:t>And for each user we have document linking for their reviewed movies</a:t>
+            </a:r>
+          </a:p>
+          <a:p>
+            <a:endParaRPr lang="en-US" dirty="0"/>
+          </a:p>
+          <a:p>
+            <a:r>
+              <a:rPr lang="en-US" dirty="0"/>
+              <a:t>We also implemented a redundancy for the last 3 reviews of a user, that are directly </a:t>
+            </a:r>
+            <a:r>
+              <a:rPr lang="en-US" dirty="0" err="1"/>
+              <a:t>emebedded</a:t>
+            </a:r>
+            <a:r>
+              <a:rPr lang="en-US" dirty="0"/>
+              <a:t> </a:t>
+            </a:r>
+            <a:r>
+              <a:rPr lang="en-US" dirty="0" err="1"/>
+              <a:t>whithin</a:t>
+            </a:r>
+            <a:r>
+              <a:rPr lang="en-US" dirty="0"/>
+              <a:t> its document.</a:t>
+            </a:r>
+          </a:p>
+          <a:p>
+            <a:endParaRPr lang="en-US" dirty="0"/>
+          </a:p>
+          <a:p>
+            <a:r>
+              <a:rPr lang="en-US" dirty="0"/>
+              <a:t>This is to reduce database computational load each time a user wants to read its recent reviews, which is much more likely to happen instead of retrieving all of them.</a:t>
+            </a:r>
+          </a:p>
+          <a:p>
+            <a:endParaRPr lang="en-US" dirty="0"/>
+          </a:p>
+          <a:p>
+            <a:r>
+              <a:rPr lang="en-US" dirty="0"/>
+              <a:t>We also present some interesting queries that can be performed on the </a:t>
+            </a:r>
+            <a:r>
+              <a:rPr lang="en-US" dirty="0" err="1"/>
+              <a:t>docuemnt</a:t>
+            </a:r>
+            <a:r>
+              <a:rPr lang="en-US" dirty="0"/>
+              <a:t> </a:t>
+            </a:r>
+            <a:r>
+              <a:rPr lang="en-US" dirty="0" err="1"/>
+              <a:t>db</a:t>
+            </a:r>
+            <a:r>
+              <a:rPr lang="en-US" dirty="0"/>
+              <a:t>:</a:t>
+            </a:r>
+          </a:p>
+          <a:p>
+            <a:r>
+              <a:rPr lang="en-US" dirty="0"/>
+              <a:t>- for each genre or each year we can retrieve the most positive or negative reviewed movie</a:t>
+            </a:r>
+          </a:p>
+          <a:p>
+            <a:r>
+              <a:rPr lang="en-US" dirty="0"/>
+              <a:t>- or, as said previously, the movies with the most aligned or disagreements between top critics and </a:t>
+            </a:r>
+            <a:r>
+              <a:rPr lang="en-US" dirty="0" err="1"/>
+              <a:t>audiance</a:t>
+            </a:r>
+            <a:endParaRPr lang="en-US" dirty="0"/>
+          </a:p>
+          <a:p>
+            <a:r>
+              <a:rPr lang="en-US" dirty="0"/>
+              <a:t>- and also, for the administrator, the list of most active users in terms of reviews</a:t>
+            </a:r>
+            <a:endParaRPr lang="it-IT" dirty="0"/>
+          </a:p>
+        </p:txBody>
+      </p:sp>
+      <p:sp>
+        <p:nvSpPr>
+          <p:cNvPr id="4" name="Segnaposto numero diapositiva 3"/>
+          <p:cNvSpPr>
+            <a:spLocks noGrp="1"/>
+          </p:cNvSpPr>
+          <p:nvPr>
+            <p:ph type="sldNum" sz="quarter" idx="5"/>
+          </p:nvPr>
+        </p:nvSpPr>
+        <p:spPr/>
+        <p:txBody>
+          <a:bodyPr/>
+          <a:lstStyle/>
+          <a:p>
+            <a:fld id="{60FDF8BA-B6A2-CC4D-B552-37BF044E1040}" type="slidenum">
+              <a:rPr lang="it-IT" smtClean="0"/>
+              <a:t>6</a:t>
+            </a:fld>
+            <a:endParaRPr lang="it-IT"/>
+          </a:p>
+        </p:txBody>
+      </p:sp>
+    </p:spTree>
+    <p:extLst>
+      <p:ext uri="{BB962C8B-B14F-4D97-AF65-F5344CB8AC3E}">
+        <p14:creationId xmlns:p14="http://schemas.microsoft.com/office/powerpoint/2010/main" val="3286405843"/>
+      </p:ext>
+    </p:extLst>
+  </p:cSld>
+  <p:clrMapOvr>
+    <a:masterClrMapping/>
+  </p:clrMapOvr>
+</p:notes>
+</file>
+
+<file path=ppt/notesSlides/notesSlide7.xml><?xml version="1.0" encoding="utf-8"?>
+<p:notes xmlns:a="http://schemas.openxmlformats.org/drawingml/2006/main" xmlns:r="http://schemas.openxmlformats.org/officeDocument/2006/relationships" xmlns:p="http://schemas.openxmlformats.org/presentationml/2006/main">
+  <p:cSld>
+    <p:spTree>
+      <p:nvGrpSpPr>
+        <p:cNvPr id="1" name=""/>
+        <p:cNvGrpSpPr/>
+        <p:nvPr/>
+      </p:nvGrpSpPr>
+      <p:grpSpPr>
+        <a:xfrm>
+          <a:off x="0" y="0"/>
+          <a:ext cx="0" cy="0"/>
+          <a:chOff x="0" y="0"/>
+          <a:chExt cx="0" cy="0"/>
+        </a:xfrm>
+      </p:grpSpPr>
+      <p:sp>
+        <p:nvSpPr>
+          <p:cNvPr id="2" name="Segnaposto immagine diapositiva 1"/>
+          <p:cNvSpPr>
+            <a:spLocks noGrp="1" noRot="1" noChangeAspect="1"/>
+          </p:cNvSpPr>
+          <p:nvPr>
+            <p:ph type="sldImg"/>
+          </p:nvPr>
+        </p:nvSpPr>
+        <p:spPr/>
+      </p:sp>
+      <p:sp>
+        <p:nvSpPr>
+          <p:cNvPr id="3" name="Segnaposto note 2"/>
+          <p:cNvSpPr>
+            <a:spLocks noGrp="1"/>
+          </p:cNvSpPr>
+          <p:nvPr>
+            <p:ph type="body" idx="1"/>
+          </p:nvPr>
+        </p:nvSpPr>
+        <p:spPr/>
+        <p:txBody>
+          <a:bodyPr/>
+          <a:lstStyle/>
+          <a:p>
+            <a:r>
+              <a:rPr lang="en-US" dirty="0"/>
+              <a:t>In the graph DB we have decided to have three entities: User, Top Critic and Movie. </a:t>
+            </a:r>
+          </a:p>
+          <a:p>
+            <a:endParaRPr lang="en-US" dirty="0"/>
+          </a:p>
+          <a:p>
+            <a:r>
+              <a:rPr lang="en-US" dirty="0"/>
+              <a:t>Every registered user is linked to the movies that they have reviewed, the link contains the </a:t>
+            </a:r>
+            <a:r>
+              <a:rPr lang="en-US" dirty="0" err="1"/>
+              <a:t>raiting</a:t>
+            </a:r>
+            <a:r>
+              <a:rPr lang="en-US" dirty="0"/>
+              <a:t> and a preview of the entire review</a:t>
+            </a:r>
+          </a:p>
+          <a:p>
+            <a:endParaRPr lang="en-US" dirty="0"/>
+          </a:p>
+          <a:p>
+            <a:r>
+              <a:rPr lang="en-US" dirty="0"/>
+              <a:t>In addition each normal user is connected to the top critics that they follow to keep track with their thinking.</a:t>
+            </a:r>
+          </a:p>
+          <a:p>
+            <a:endParaRPr lang="en-US" dirty="0"/>
+          </a:p>
+          <a:p>
+            <a:r>
+              <a:rPr lang="en-US" dirty="0"/>
+              <a:t>We also present some interesting queries that can be performed on the graph </a:t>
+            </a:r>
+            <a:r>
+              <a:rPr lang="en-US" dirty="0" err="1"/>
+              <a:t>db</a:t>
+            </a:r>
+            <a:r>
+              <a:rPr lang="en-US" dirty="0"/>
+              <a:t>:</a:t>
+            </a:r>
+          </a:p>
+          <a:p>
+            <a:r>
+              <a:rPr lang="en-US" dirty="0"/>
+              <a:t>- find the most followed top critics</a:t>
+            </a:r>
+          </a:p>
+          <a:p>
+            <a:r>
+              <a:rPr lang="en-US" dirty="0"/>
+              <a:t>- find the last reviews of all top critics followed by a particular user to build their feed</a:t>
+            </a:r>
+          </a:p>
+          <a:p>
+            <a:r>
+              <a:rPr lang="en-US" dirty="0"/>
+              <a:t>- suggesting a not already followed top critics based upon the affinity calculated by confronting ratings on movies revied by both</a:t>
+            </a:r>
+            <a:endParaRPr lang="it-IT" dirty="0"/>
+          </a:p>
+        </p:txBody>
+      </p:sp>
+      <p:sp>
+        <p:nvSpPr>
+          <p:cNvPr id="4" name="Segnaposto numero diapositiva 3"/>
+          <p:cNvSpPr>
+            <a:spLocks noGrp="1"/>
+          </p:cNvSpPr>
+          <p:nvPr>
+            <p:ph type="sldNum" sz="quarter" idx="5"/>
+          </p:nvPr>
+        </p:nvSpPr>
+        <p:spPr/>
+        <p:txBody>
+          <a:bodyPr/>
+          <a:lstStyle/>
+          <a:p>
+            <a:fld id="{60FDF8BA-B6A2-CC4D-B552-37BF044E1040}" type="slidenum">
+              <a:rPr lang="it-IT" smtClean="0"/>
+              <a:t>7</a:t>
+            </a:fld>
+            <a:endParaRPr lang="it-IT"/>
+          </a:p>
+        </p:txBody>
+      </p:sp>
+    </p:spTree>
+    <p:extLst>
+      <p:ext uri="{BB962C8B-B14F-4D97-AF65-F5344CB8AC3E}">
+        <p14:creationId xmlns:p14="http://schemas.microsoft.com/office/powerpoint/2010/main" val="4116355415"/>
+      </p:ext>
+    </p:extLst>
+  </p:cSld>
+  <p:clrMapOvr>
+    <a:masterClrMapping/>
+  </p:clrMapOvr>
+</p:notes>
+</file>
+
+<file path=ppt/notesSlides/notesSlide8.xml><?xml version="1.0" encoding="utf-8"?>
+<p:notes xmlns:a="http://schemas.openxmlformats.org/drawingml/2006/main" xmlns:r="http://schemas.openxmlformats.org/officeDocument/2006/relationships" xmlns:p="http://schemas.openxmlformats.org/presentationml/2006/main">
+  <p:cSld>
+    <p:spTree>
+      <p:nvGrpSpPr>
+        <p:cNvPr id="1" name=""/>
+        <p:cNvGrpSpPr/>
+        <p:nvPr/>
+      </p:nvGrpSpPr>
+      <p:grpSpPr>
+        <a:xfrm>
+          <a:off x="0" y="0"/>
+          <a:ext cx="0" cy="0"/>
+          <a:chOff x="0" y="0"/>
+          <a:chExt cx="0" cy="0"/>
+        </a:xfrm>
+      </p:grpSpPr>
+      <p:sp>
+        <p:nvSpPr>
+          <p:cNvPr id="2" name="Segnaposto immagine diapositiva 1"/>
+          <p:cNvSpPr>
+            <a:spLocks noGrp="1" noRot="1" noChangeAspect="1"/>
+          </p:cNvSpPr>
+          <p:nvPr>
+            <p:ph type="sldImg"/>
+          </p:nvPr>
+        </p:nvSpPr>
+        <p:spPr/>
+      </p:sp>
+      <p:sp>
+        <p:nvSpPr>
+          <p:cNvPr id="3" name="Segnaposto note 2"/>
+          <p:cNvSpPr>
+            <a:spLocks noGrp="1"/>
+          </p:cNvSpPr>
+          <p:nvPr>
+            <p:ph type="body" idx="1"/>
+          </p:nvPr>
+        </p:nvSpPr>
+        <p:spPr/>
+        <p:txBody>
+          <a:bodyPr/>
+          <a:lstStyle/>
+          <a:p>
+            <a:r>
+              <a:rPr lang="en-US" dirty="0"/>
+              <a:t>Our idea for the implementation of the software is to use Python for data scraping and cleaning and to use Java to create the application logic. </a:t>
+            </a:r>
+          </a:p>
+          <a:p>
+            <a:endParaRPr lang="en-US" dirty="0"/>
+          </a:p>
+          <a:p>
+            <a:r>
+              <a:rPr lang="en-US" dirty="0"/>
+              <a:t>The DBMS we intent to use for this project are </a:t>
+            </a:r>
+            <a:r>
+              <a:rPr lang="en-US" dirty="0" err="1"/>
+              <a:t>mongoDB</a:t>
+            </a:r>
+            <a:r>
+              <a:rPr lang="en-US" dirty="0"/>
+              <a:t> and Neo4j</a:t>
+            </a:r>
+          </a:p>
+          <a:p>
+            <a:endParaRPr lang="en-US" dirty="0"/>
+          </a:p>
+          <a:p>
+            <a:r>
+              <a:rPr lang="en-US" dirty="0"/>
+              <a:t>and here are other tools used during the initial stage of development</a:t>
+            </a:r>
+            <a:endParaRPr lang="it-IT" dirty="0"/>
+          </a:p>
+        </p:txBody>
+      </p:sp>
+      <p:sp>
+        <p:nvSpPr>
+          <p:cNvPr id="4" name="Segnaposto numero diapositiva 3"/>
+          <p:cNvSpPr>
+            <a:spLocks noGrp="1"/>
+          </p:cNvSpPr>
+          <p:nvPr>
+            <p:ph type="sldNum" sz="quarter" idx="5"/>
+          </p:nvPr>
+        </p:nvSpPr>
+        <p:spPr/>
+        <p:txBody>
+          <a:bodyPr/>
+          <a:lstStyle/>
+          <a:p>
+            <a:fld id="{60FDF8BA-B6A2-CC4D-B552-37BF044E1040}" type="slidenum">
+              <a:rPr lang="it-IT" smtClean="0"/>
+              <a:t>8</a:t>
+            </a:fld>
+            <a:endParaRPr lang="it-IT"/>
+          </a:p>
+        </p:txBody>
+      </p:sp>
+    </p:spTree>
+    <p:extLst>
+      <p:ext uri="{BB962C8B-B14F-4D97-AF65-F5344CB8AC3E}">
+        <p14:creationId xmlns:p14="http://schemas.microsoft.com/office/powerpoint/2010/main" val="3439780579"/>
+      </p:ext>
+    </p:extLst>
+  </p:cSld>
+  <p:clrMapOvr>
+    <a:masterClrMapping/>
+  </p:clrMapOvr>
+</p:notes>
+</file>
+
 <file path=ppt/slideLayouts/slideLayout1.xml><?xml version="1.0" encoding="utf-8"?>
 <p:sldLayout xmlns:a="http://schemas.openxmlformats.org/drawingml/2006/main" xmlns:r="http://schemas.openxmlformats.org/officeDocument/2006/relationships" xmlns:p="http://schemas.openxmlformats.org/presentationml/2006/main" type="title" preserve="1">
   <p:cSld name="Diapositiva titolo">
@@ -4343,7 +5444,7 @@
           <p:nvPr/>
         </p:nvPicPr>
         <p:blipFill>
-          <a:blip r:embed="rId2"/>
+          <a:blip r:embed="rId3"/>
           <a:stretch>
             <a:fillRect/>
           </a:stretch>
@@ -4471,7 +5572,7 @@
                 </a:solidFill>
                 <a:effectLst/>
                 <a:latin typeface="zeitung"/>
-                <a:hlinkClick r:id="rId2"/>
+                <a:hlinkClick r:id="rId3"/>
               </a:rPr>
               <a:t>https://www.kaggle.com/datasets/stefanoleone992/rotten-tomatoes-movies-and-critic-reviews-dataset</a:t>
             </a:r>
@@ -4505,7 +5606,7 @@
                 </a:solidFill>
                 <a:effectLst/>
                 <a:latin typeface="zeitung"/>
-                <a:hlinkClick r:id="rId3"/>
+                <a:hlinkClick r:id="rId4"/>
               </a:rPr>
               <a:t>https://datasets.imdbws.com/</a:t>
             </a:r>
@@ -4546,7 +5647,7 @@
                   <a:srgbClr val="202124"/>
                 </a:solidFill>
                 <a:latin typeface="zeitung"/>
-                <a:hlinkClick r:id="rId4"/>
+                <a:hlinkClick r:id="rId5"/>
               </a:rPr>
               <a:t>https://randomuser.me/</a:t>
             </a:r>
@@ -4710,7 +5811,7 @@
           <p:nvPr/>
         </p:nvPicPr>
         <p:blipFill>
-          <a:blip r:embed="rId2"/>
+          <a:blip r:embed="rId3"/>
           <a:stretch>
             <a:fillRect/>
           </a:stretch>
@@ -4924,7 +6025,7 @@
           <p:nvPr/>
         </p:nvPicPr>
         <p:blipFill>
-          <a:blip r:embed="rId2"/>
+          <a:blip r:embed="rId3"/>
           <a:stretch>
             <a:fillRect/>
           </a:stretch>
@@ -4954,7 +6055,7 @@
           <p:nvPr/>
         </p:nvPicPr>
         <p:blipFill>
-          <a:blip r:embed="rId3"/>
+          <a:blip r:embed="rId4"/>
           <a:stretch>
             <a:fillRect/>
           </a:stretch>
@@ -5186,7 +6287,7 @@
           <p:nvPr/>
         </p:nvPicPr>
         <p:blipFill>
-          <a:blip r:embed="rId2"/>
+          <a:blip r:embed="rId3"/>
           <a:stretch>
             <a:fillRect/>
           </a:stretch>

</xml_diff>

<commit_message>
last minute change user-follows-topcritic relationship in uml diagram
</commit_message>
<xml_diff>
--- a/Presentazione.pptx
+++ b/Presentazione.pptx
@@ -5798,10 +5798,10 @@
       </p:sp>
       <p:pic>
         <p:nvPicPr>
-          <p:cNvPr id="5" name="Immagine 4">
+          <p:cNvPr id="4" name="Immagine 3">
             <a:extLst>
               <a:ext uri="{FF2B5EF4-FFF2-40B4-BE49-F238E27FC236}">
-                <a16:creationId xmlns:a16="http://schemas.microsoft.com/office/drawing/2014/main" id="{D67212DD-1168-C6F8-3B2D-C10917E98340}"/>
+                <a16:creationId xmlns:a16="http://schemas.microsoft.com/office/drawing/2014/main" id="{74D949B4-8DC1-4E22-51D6-530EDBD0B07C}"/>
               </a:ext>
             </a:extLst>
           </p:cNvPr>
@@ -5818,8 +5818,8 @@
         </p:blipFill>
         <p:spPr>
           <a:xfrm>
-            <a:off x="38971" y="1323277"/>
-            <a:ext cx="9066058" cy="4396804"/>
+            <a:off x="182741" y="1216436"/>
+            <a:ext cx="8778518" cy="4425127"/>
           </a:xfrm>
           <a:prstGeom prst="rect">
             <a:avLst/>

</xml_diff>

<commit_message>
add suggested changes to the presentation
</commit_message>
<xml_diff>
--- a/Presentazione.pptx
+++ b/Presentazione.pptx
@@ -557,7 +557,7 @@
           <a:p>
             <a:fld id="{60FDF8BA-B6A2-CC4D-B552-37BF044E1040}" type="slidenum">
               <a:rPr lang="it-IT" smtClean="0"/>
-              <a:t>‹N›</a:t>
+              <a:t>‹#›</a:t>
             </a:fld>
             <a:endParaRPr lang="it-IT"/>
           </a:p>
@@ -2012,7 +2012,7 @@
           <a:p>
             <a:fld id="{F3EAF9BD-73C2-C944-967F-16A9AD6CE362}" type="slidenum">
               <a:rPr lang="it-IT" smtClean="0"/>
-              <a:t>‹N›</a:t>
+              <a:t>‹#›</a:t>
             </a:fld>
             <a:endParaRPr lang="it-IT"/>
           </a:p>
@@ -2204,7 +2204,7 @@
           <a:p>
             <a:fld id="{F3EAF9BD-73C2-C944-967F-16A9AD6CE362}" type="slidenum">
               <a:rPr lang="it-IT" smtClean="0"/>
-              <a:t>‹N›</a:t>
+              <a:t>‹#›</a:t>
             </a:fld>
             <a:endParaRPr lang="it-IT"/>
           </a:p>
@@ -2406,7 +2406,7 @@
           <a:p>
             <a:fld id="{F3EAF9BD-73C2-C944-967F-16A9AD6CE362}" type="slidenum">
               <a:rPr lang="it-IT" smtClean="0"/>
-              <a:t>‹N›</a:t>
+              <a:t>‹#›</a:t>
             </a:fld>
             <a:endParaRPr lang="it-IT"/>
           </a:p>
@@ -2598,7 +2598,7 @@
           <a:p>
             <a:fld id="{F3EAF9BD-73C2-C944-967F-16A9AD6CE362}" type="slidenum">
               <a:rPr lang="it-IT" smtClean="0"/>
-              <a:t>‹N›</a:t>
+              <a:t>‹#›</a:t>
             </a:fld>
             <a:endParaRPr lang="it-IT"/>
           </a:p>
@@ -2867,7 +2867,7 @@
           <a:p>
             <a:fld id="{F3EAF9BD-73C2-C944-967F-16A9AD6CE362}" type="slidenum">
               <a:rPr lang="it-IT" smtClean="0"/>
-              <a:t>‹N›</a:t>
+              <a:t>‹#›</a:t>
             </a:fld>
             <a:endParaRPr lang="it-IT"/>
           </a:p>
@@ -3176,7 +3176,7 @@
           <a:p>
             <a:fld id="{F3EAF9BD-73C2-C944-967F-16A9AD6CE362}" type="slidenum">
               <a:rPr lang="it-IT" smtClean="0"/>
-              <a:t>‹N›</a:t>
+              <a:t>‹#›</a:t>
             </a:fld>
             <a:endParaRPr lang="it-IT"/>
           </a:p>
@@ -3619,7 +3619,7 @@
           <a:p>
             <a:fld id="{F3EAF9BD-73C2-C944-967F-16A9AD6CE362}" type="slidenum">
               <a:rPr lang="it-IT" smtClean="0"/>
-              <a:t>‹N›</a:t>
+              <a:t>‹#›</a:t>
             </a:fld>
             <a:endParaRPr lang="it-IT"/>
           </a:p>
@@ -3760,7 +3760,7 @@
           <a:p>
             <a:fld id="{F3EAF9BD-73C2-C944-967F-16A9AD6CE362}" type="slidenum">
               <a:rPr lang="it-IT" smtClean="0"/>
-              <a:t>‹N›</a:t>
+              <a:t>‹#›</a:t>
             </a:fld>
             <a:endParaRPr lang="it-IT"/>
           </a:p>
@@ -3879,7 +3879,7 @@
           <a:p>
             <a:fld id="{F3EAF9BD-73C2-C944-967F-16A9AD6CE362}" type="slidenum">
               <a:rPr lang="it-IT" smtClean="0"/>
-              <a:t>‹N›</a:t>
+              <a:t>‹#›</a:t>
             </a:fld>
             <a:endParaRPr lang="it-IT"/>
           </a:p>
@@ -4178,7 +4178,7 @@
           <a:p>
             <a:fld id="{F3EAF9BD-73C2-C944-967F-16A9AD6CE362}" type="slidenum">
               <a:rPr lang="it-IT" smtClean="0"/>
-              <a:t>‹N›</a:t>
+              <a:t>‹#›</a:t>
             </a:fld>
             <a:endParaRPr lang="it-IT"/>
           </a:p>
@@ -4454,7 +4454,7 @@
           <a:p>
             <a:fld id="{F3EAF9BD-73C2-C944-967F-16A9AD6CE362}" type="slidenum">
               <a:rPr lang="it-IT" smtClean="0"/>
-              <a:t>‹N›</a:t>
+              <a:t>‹#›</a:t>
             </a:fld>
             <a:endParaRPr lang="it-IT"/>
           </a:p>
@@ -5927,7 +5927,7 @@
             </a:r>
             <a:r>
               <a:rPr lang="en-US" sz="2000" dirty="0"/>
-              <a:t>Movie, User</a:t>
+              <a:t>Movie, User, Review, Worker</a:t>
             </a:r>
           </a:p>
           <a:p>
@@ -5968,7 +5968,7 @@
             </a:pPr>
             <a:r>
               <a:rPr lang="en-US" sz="2000" dirty="0"/>
-              <a:t>Most positive reviewed movies for each genre</a:t>
+              <a:t>Most positive reviewed movies for each genre/year</a:t>
             </a:r>
           </a:p>
           <a:p>
@@ -5978,7 +5978,7 @@
             </a:pPr>
             <a:r>
               <a:rPr lang="en-US" sz="2000" dirty="0"/>
-              <a:t>Most positive reviewed movies for each year</a:t>
+              <a:t>Best production houses</a:t>
             </a:r>
           </a:p>
           <a:p>
@@ -6257,7 +6257,7 @@
             </a:pPr>
             <a:r>
               <a:rPr lang="en-US" sz="2000" dirty="0"/>
-              <a:t>Last reviews of followed top critics</a:t>
+              <a:t>Last reviewed movies of followed top critics</a:t>
             </a:r>
           </a:p>
           <a:p>

</xml_diff>

<commit_message>
Modified the query for document db
</commit_message>
<xml_diff>
--- a/Presentazione.pptx
+++ b/Presentazione.pptx
@@ -168,48 +168,9 @@
     </pc:docChg>
   </pc:docChgLst>
   <pc:docChgLst>
-    <pc:chgData name="Pietro Ducange" userId="3881275a-5346-4624-88aa-cc4682e089e6" providerId="ADAL" clId="{51DA83A5-9DAC-2E4E-98CB-0F60CD469263}"/>
-    <pc:docChg chg="modSld">
-      <pc:chgData name="Pietro Ducange" userId="3881275a-5346-4624-88aa-cc4682e089e6" providerId="ADAL" clId="{51DA83A5-9DAC-2E4E-98CB-0F60CD469263}" dt="2020-11-23T15:19:35.337" v="73" actId="14100"/>
-      <pc:docMkLst>
-        <pc:docMk/>
-      </pc:docMkLst>
-      <pc:sldChg chg="modSp mod">
-        <pc:chgData name="Pietro Ducange" userId="3881275a-5346-4624-88aa-cc4682e089e6" providerId="ADAL" clId="{51DA83A5-9DAC-2E4E-98CB-0F60CD469263}" dt="2020-11-23T15:19:35.337" v="73" actId="14100"/>
-        <pc:sldMkLst>
-          <pc:docMk/>
-          <pc:sldMk cId="1621469791" sldId="256"/>
-        </pc:sldMkLst>
-        <pc:spChg chg="mod">
-          <ac:chgData name="Pietro Ducange" userId="3881275a-5346-4624-88aa-cc4682e089e6" providerId="ADAL" clId="{51DA83A5-9DAC-2E4E-98CB-0F60CD469263}" dt="2020-11-23T15:19:35.337" v="73" actId="14100"/>
-          <ac:spMkLst>
-            <pc:docMk/>
-            <pc:sldMk cId="1621469791" sldId="256"/>
-            <ac:spMk id="2" creationId="{00000000-0000-0000-0000-000000000000}"/>
-          </ac:spMkLst>
-        </pc:spChg>
-      </pc:sldChg>
-      <pc:sldChg chg="addSp modSp mod">
-        <pc:chgData name="Pietro Ducange" userId="3881275a-5346-4624-88aa-cc4682e089e6" providerId="ADAL" clId="{51DA83A5-9DAC-2E4E-98CB-0F60CD469263}" dt="2020-11-23T10:48:14.343" v="71" actId="20577"/>
-        <pc:sldMkLst>
-          <pc:docMk/>
-          <pc:sldMk cId="710998634" sldId="263"/>
-        </pc:sldMkLst>
-        <pc:spChg chg="add mod">
-          <ac:chgData name="Pietro Ducange" userId="3881275a-5346-4624-88aa-cc4682e089e6" providerId="ADAL" clId="{51DA83A5-9DAC-2E4E-98CB-0F60CD469263}" dt="2020-11-23T10:48:14.343" v="71" actId="20577"/>
-          <ac:spMkLst>
-            <pc:docMk/>
-            <pc:sldMk cId="710998634" sldId="263"/>
-            <ac:spMk id="3" creationId="{391F4034-971B-8A4B-888B-5902E8333D6B}"/>
-          </ac:spMkLst>
-        </pc:spChg>
-      </pc:sldChg>
-    </pc:docChg>
-  </pc:docChgLst>
-  <pc:docChgLst>
     <pc:chgData name="Giacomo Volpi" userId="23fb5a46-3f6f-48f0-a51b-4e2cf33c8ac9" providerId="ADAL" clId="{9A323347-3376-446A-9D0B-571111A78440}"/>
     <pc:docChg chg="undo custSel modSld">
-      <pc:chgData name="Giacomo Volpi" userId="23fb5a46-3f6f-48f0-a51b-4e2cf33c8ac9" providerId="ADAL" clId="{9A323347-3376-446A-9D0B-571111A78440}" dt="2022-12-07T13:59:39.335" v="250" actId="20577"/>
+      <pc:chgData name="Giacomo Volpi" userId="23fb5a46-3f6f-48f0-a51b-4e2cf33c8ac9" providerId="ADAL" clId="{9A323347-3376-446A-9D0B-571111A78440}" dt="2022-12-16T09:25:56.368" v="288" actId="20577"/>
       <pc:docMkLst>
         <pc:docMk/>
       </pc:docMkLst>
@@ -260,13 +221,13 @@
         </pc:picChg>
       </pc:sldChg>
       <pc:sldChg chg="addSp modSp mod">
-        <pc:chgData name="Giacomo Volpi" userId="23fb5a46-3f6f-48f0-a51b-4e2cf33c8ac9" providerId="ADAL" clId="{9A323347-3376-446A-9D0B-571111A78440}" dt="2022-12-07T13:58:10.762" v="191" actId="20577"/>
+        <pc:chgData name="Giacomo Volpi" userId="23fb5a46-3f6f-48f0-a51b-4e2cf33c8ac9" providerId="ADAL" clId="{9A323347-3376-446A-9D0B-571111A78440}" dt="2022-12-16T09:25:56.368" v="288" actId="20577"/>
         <pc:sldMkLst>
           <pc:docMk/>
           <pc:sldMk cId="877565826" sldId="260"/>
         </pc:sldMkLst>
         <pc:spChg chg="add mod">
-          <ac:chgData name="Giacomo Volpi" userId="23fb5a46-3f6f-48f0-a51b-4e2cf33c8ac9" providerId="ADAL" clId="{9A323347-3376-446A-9D0B-571111A78440}" dt="2022-12-07T13:58:10.762" v="191" actId="20577"/>
+          <ac:chgData name="Giacomo Volpi" userId="23fb5a46-3f6f-48f0-a51b-4e2cf33c8ac9" providerId="ADAL" clId="{9A323347-3376-446A-9D0B-571111A78440}" dt="2022-12-16T09:25:56.368" v="288" actId="20577"/>
           <ac:spMkLst>
             <pc:docMk/>
             <pc:sldMk cId="877565826" sldId="260"/>
@@ -314,6 +275,45 @@
       </pc:sldChg>
     </pc:docChg>
   </pc:docChgLst>
+  <pc:docChgLst>
+    <pc:chgData name="Pietro Ducange" userId="3881275a-5346-4624-88aa-cc4682e089e6" providerId="ADAL" clId="{51DA83A5-9DAC-2E4E-98CB-0F60CD469263}"/>
+    <pc:docChg chg="modSld">
+      <pc:chgData name="Pietro Ducange" userId="3881275a-5346-4624-88aa-cc4682e089e6" providerId="ADAL" clId="{51DA83A5-9DAC-2E4E-98CB-0F60CD469263}" dt="2020-11-23T15:19:35.337" v="73" actId="14100"/>
+      <pc:docMkLst>
+        <pc:docMk/>
+      </pc:docMkLst>
+      <pc:sldChg chg="modSp mod">
+        <pc:chgData name="Pietro Ducange" userId="3881275a-5346-4624-88aa-cc4682e089e6" providerId="ADAL" clId="{51DA83A5-9DAC-2E4E-98CB-0F60CD469263}" dt="2020-11-23T15:19:35.337" v="73" actId="14100"/>
+        <pc:sldMkLst>
+          <pc:docMk/>
+          <pc:sldMk cId="1621469791" sldId="256"/>
+        </pc:sldMkLst>
+        <pc:spChg chg="mod">
+          <ac:chgData name="Pietro Ducange" userId="3881275a-5346-4624-88aa-cc4682e089e6" providerId="ADAL" clId="{51DA83A5-9DAC-2E4E-98CB-0F60CD469263}" dt="2020-11-23T15:19:35.337" v="73" actId="14100"/>
+          <ac:spMkLst>
+            <pc:docMk/>
+            <pc:sldMk cId="1621469791" sldId="256"/>
+            <ac:spMk id="2" creationId="{00000000-0000-0000-0000-000000000000}"/>
+          </ac:spMkLst>
+        </pc:spChg>
+      </pc:sldChg>
+      <pc:sldChg chg="addSp modSp mod">
+        <pc:chgData name="Pietro Ducange" userId="3881275a-5346-4624-88aa-cc4682e089e6" providerId="ADAL" clId="{51DA83A5-9DAC-2E4E-98CB-0F60CD469263}" dt="2020-11-23T10:48:14.343" v="71" actId="20577"/>
+        <pc:sldMkLst>
+          <pc:docMk/>
+          <pc:sldMk cId="710998634" sldId="263"/>
+        </pc:sldMkLst>
+        <pc:spChg chg="add mod">
+          <ac:chgData name="Pietro Ducange" userId="3881275a-5346-4624-88aa-cc4682e089e6" providerId="ADAL" clId="{51DA83A5-9DAC-2E4E-98CB-0F60CD469263}" dt="2020-11-23T10:48:14.343" v="71" actId="20577"/>
+          <ac:spMkLst>
+            <pc:docMk/>
+            <pc:sldMk cId="710998634" sldId="263"/>
+            <ac:spMk id="3" creationId="{391F4034-971B-8A4B-888B-5902E8333D6B}"/>
+          </ac:spMkLst>
+        </pc:spChg>
+      </pc:sldChg>
+    </pc:docChg>
+  </pc:docChgLst>
 </pc:chgInfo>
 </file>
 
@@ -399,7 +399,7 @@
           <a:p>
             <a:fld id="{0EF95162-6873-F647-B392-BF6A1F606277}" type="datetimeFigureOut">
               <a:rPr lang="it-IT" smtClean="0"/>
-              <a:t>13/12/2022</a:t>
+              <a:t>16/12/2022</a:t>
             </a:fld>
             <a:endParaRPr lang="it-IT"/>
           </a:p>
@@ -557,7 +557,7 @@
           <a:p>
             <a:fld id="{60FDF8BA-B6A2-CC4D-B552-37BF044E1040}" type="slidenum">
               <a:rPr lang="it-IT" smtClean="0"/>
-              <a:t>‹#›</a:t>
+              <a:t>‹N›</a:t>
             </a:fld>
             <a:endParaRPr lang="it-IT"/>
           </a:p>
@@ -1954,7 +1954,7 @@
           <a:p>
             <a:fld id="{2FDCBEE4-315A-8E42-835E-29A1DAE07625}" type="datetimeFigureOut">
               <a:rPr lang="it-IT" smtClean="0"/>
-              <a:t>13/12/2022</a:t>
+              <a:t>16/12/2022</a:t>
             </a:fld>
             <a:endParaRPr lang="it-IT"/>
           </a:p>
@@ -2012,7 +2012,7 @@
           <a:p>
             <a:fld id="{F3EAF9BD-73C2-C944-967F-16A9AD6CE362}" type="slidenum">
               <a:rPr lang="it-IT" smtClean="0"/>
-              <a:t>‹#›</a:t>
+              <a:t>‹N›</a:t>
             </a:fld>
             <a:endParaRPr lang="it-IT"/>
           </a:p>
@@ -2146,7 +2146,7 @@
           <a:p>
             <a:fld id="{2FDCBEE4-315A-8E42-835E-29A1DAE07625}" type="datetimeFigureOut">
               <a:rPr lang="it-IT" smtClean="0"/>
-              <a:t>13/12/2022</a:t>
+              <a:t>16/12/2022</a:t>
             </a:fld>
             <a:endParaRPr lang="it-IT"/>
           </a:p>
@@ -2204,7 +2204,7 @@
           <a:p>
             <a:fld id="{F3EAF9BD-73C2-C944-967F-16A9AD6CE362}" type="slidenum">
               <a:rPr lang="it-IT" smtClean="0"/>
-              <a:t>‹#›</a:t>
+              <a:t>‹N›</a:t>
             </a:fld>
             <a:endParaRPr lang="it-IT"/>
           </a:p>
@@ -2348,7 +2348,7 @@
           <a:p>
             <a:fld id="{2FDCBEE4-315A-8E42-835E-29A1DAE07625}" type="datetimeFigureOut">
               <a:rPr lang="it-IT" smtClean="0"/>
-              <a:t>13/12/2022</a:t>
+              <a:t>16/12/2022</a:t>
             </a:fld>
             <a:endParaRPr lang="it-IT"/>
           </a:p>
@@ -2406,7 +2406,7 @@
           <a:p>
             <a:fld id="{F3EAF9BD-73C2-C944-967F-16A9AD6CE362}" type="slidenum">
               <a:rPr lang="it-IT" smtClean="0"/>
-              <a:t>‹#›</a:t>
+              <a:t>‹N›</a:t>
             </a:fld>
             <a:endParaRPr lang="it-IT"/>
           </a:p>
@@ -2540,7 +2540,7 @@
           <a:p>
             <a:fld id="{2FDCBEE4-315A-8E42-835E-29A1DAE07625}" type="datetimeFigureOut">
               <a:rPr lang="it-IT" smtClean="0"/>
-              <a:t>13/12/2022</a:t>
+              <a:t>16/12/2022</a:t>
             </a:fld>
             <a:endParaRPr lang="it-IT"/>
           </a:p>
@@ -2598,7 +2598,7 @@
           <a:p>
             <a:fld id="{F3EAF9BD-73C2-C944-967F-16A9AD6CE362}" type="slidenum">
               <a:rPr lang="it-IT" smtClean="0"/>
-              <a:t>‹#›</a:t>
+              <a:t>‹N›</a:t>
             </a:fld>
             <a:endParaRPr lang="it-IT"/>
           </a:p>
@@ -2809,7 +2809,7 @@
           <a:p>
             <a:fld id="{2FDCBEE4-315A-8E42-835E-29A1DAE07625}" type="datetimeFigureOut">
               <a:rPr lang="it-IT" smtClean="0"/>
-              <a:t>13/12/2022</a:t>
+              <a:t>16/12/2022</a:t>
             </a:fld>
             <a:endParaRPr lang="it-IT"/>
           </a:p>
@@ -2867,7 +2867,7 @@
           <a:p>
             <a:fld id="{F3EAF9BD-73C2-C944-967F-16A9AD6CE362}" type="slidenum">
               <a:rPr lang="it-IT" smtClean="0"/>
-              <a:t>‹#›</a:t>
+              <a:t>‹N›</a:t>
             </a:fld>
             <a:endParaRPr lang="it-IT"/>
           </a:p>
@@ -3118,7 +3118,7 @@
           <a:p>
             <a:fld id="{2FDCBEE4-315A-8E42-835E-29A1DAE07625}" type="datetimeFigureOut">
               <a:rPr lang="it-IT" smtClean="0"/>
-              <a:t>13/12/2022</a:t>
+              <a:t>16/12/2022</a:t>
             </a:fld>
             <a:endParaRPr lang="it-IT"/>
           </a:p>
@@ -3176,7 +3176,7 @@
           <a:p>
             <a:fld id="{F3EAF9BD-73C2-C944-967F-16A9AD6CE362}" type="slidenum">
               <a:rPr lang="it-IT" smtClean="0"/>
-              <a:t>‹#›</a:t>
+              <a:t>‹N›</a:t>
             </a:fld>
             <a:endParaRPr lang="it-IT"/>
           </a:p>
@@ -3561,7 +3561,7 @@
           <a:p>
             <a:fld id="{2FDCBEE4-315A-8E42-835E-29A1DAE07625}" type="datetimeFigureOut">
               <a:rPr lang="it-IT" smtClean="0"/>
-              <a:t>13/12/2022</a:t>
+              <a:t>16/12/2022</a:t>
             </a:fld>
             <a:endParaRPr lang="it-IT"/>
           </a:p>
@@ -3619,7 +3619,7 @@
           <a:p>
             <a:fld id="{F3EAF9BD-73C2-C944-967F-16A9AD6CE362}" type="slidenum">
               <a:rPr lang="it-IT" smtClean="0"/>
-              <a:t>‹#›</a:t>
+              <a:t>‹N›</a:t>
             </a:fld>
             <a:endParaRPr lang="it-IT"/>
           </a:p>
@@ -3702,7 +3702,7 @@
           <a:p>
             <a:fld id="{2FDCBEE4-315A-8E42-835E-29A1DAE07625}" type="datetimeFigureOut">
               <a:rPr lang="it-IT" smtClean="0"/>
-              <a:t>13/12/2022</a:t>
+              <a:t>16/12/2022</a:t>
             </a:fld>
             <a:endParaRPr lang="it-IT"/>
           </a:p>
@@ -3760,7 +3760,7 @@
           <a:p>
             <a:fld id="{F3EAF9BD-73C2-C944-967F-16A9AD6CE362}" type="slidenum">
               <a:rPr lang="it-IT" smtClean="0"/>
-              <a:t>‹#›</a:t>
+              <a:t>‹N›</a:t>
             </a:fld>
             <a:endParaRPr lang="it-IT"/>
           </a:p>
@@ -3821,7 +3821,7 @@
           <a:p>
             <a:fld id="{2FDCBEE4-315A-8E42-835E-29A1DAE07625}" type="datetimeFigureOut">
               <a:rPr lang="it-IT" smtClean="0"/>
-              <a:t>13/12/2022</a:t>
+              <a:t>16/12/2022</a:t>
             </a:fld>
             <a:endParaRPr lang="it-IT"/>
           </a:p>
@@ -3879,7 +3879,7 @@
           <a:p>
             <a:fld id="{F3EAF9BD-73C2-C944-967F-16A9AD6CE362}" type="slidenum">
               <a:rPr lang="it-IT" smtClean="0"/>
-              <a:t>‹#›</a:t>
+              <a:t>‹N›</a:t>
             </a:fld>
             <a:endParaRPr lang="it-IT"/>
           </a:p>
@@ -4120,7 +4120,7 @@
           <a:p>
             <a:fld id="{2FDCBEE4-315A-8E42-835E-29A1DAE07625}" type="datetimeFigureOut">
               <a:rPr lang="it-IT" smtClean="0"/>
-              <a:t>13/12/2022</a:t>
+              <a:t>16/12/2022</a:t>
             </a:fld>
             <a:endParaRPr lang="it-IT"/>
           </a:p>
@@ -4178,7 +4178,7 @@
           <a:p>
             <a:fld id="{F3EAF9BD-73C2-C944-967F-16A9AD6CE362}" type="slidenum">
               <a:rPr lang="it-IT" smtClean="0"/>
-              <a:t>‹#›</a:t>
+              <a:t>‹N›</a:t>
             </a:fld>
             <a:endParaRPr lang="it-IT"/>
           </a:p>
@@ -4396,7 +4396,7 @@
           <a:p>
             <a:fld id="{2FDCBEE4-315A-8E42-835E-29A1DAE07625}" type="datetimeFigureOut">
               <a:rPr lang="it-IT" smtClean="0"/>
-              <a:t>13/12/2022</a:t>
+              <a:t>16/12/2022</a:t>
             </a:fld>
             <a:endParaRPr lang="it-IT"/>
           </a:p>
@@ -4454,7 +4454,7 @@
           <a:p>
             <a:fld id="{F3EAF9BD-73C2-C944-967F-16A9AD6CE362}" type="slidenum">
               <a:rPr lang="it-IT" smtClean="0"/>
-              <a:t>‹#›</a:t>
+              <a:t>‹N›</a:t>
             </a:fld>
             <a:endParaRPr lang="it-IT"/>
           </a:p>
@@ -5988,7 +5988,7 @@
             </a:pPr>
             <a:r>
               <a:rPr lang="en-US" sz="2000" dirty="0"/>
-              <a:t>Most divisive movies</a:t>
+              <a:t>Most divisive movies between audience and top critic</a:t>
             </a:r>
           </a:p>
           <a:p>

</xml_diff>